<commit_message>
"Bug fixes and added geolocator and playing with ai"
</commit_message>
<xml_diff>
--- a/BeLive/Diagram.pptx
+++ b/BeLive/Diagram.pptx
@@ -6,6 +6,7 @@
   </p:sldMasterIdLst>
   <p:sldIdLst>
     <p:sldId id="256" r:id="rId2"/>
+    <p:sldId id="257" r:id="rId3"/>
   </p:sldIdLst>
   <p:sldSz cx="12192000" cy="6858000"/>
   <p:notesSz cx="6858000" cy="9144000"/>
@@ -104,6 +105,11 @@
       </a:defRPr>
     </a:lvl9pPr>
   </p:defaultTextStyle>
+  <p:extLst>
+    <p:ext uri="{EFAFB233-063F-42B5-8137-9DF3F51BA10A}">
+      <p15:sldGuideLst xmlns:p15="http://schemas.microsoft.com/office/powerpoint/2012/main"/>
+    </p:ext>
+  </p:extLst>
 </p:presentation>
 </file>
 
@@ -254,7 +260,7 @@
           <a:p>
             <a:fld id="{10C9CC9A-FA46-4C53-916D-8D99362726E6}" type="datetimeFigureOut">
               <a:rPr lang="en-US" smtClean="0"/>
-              <a:t>5/2/2021</a:t>
+              <a:t>7/2/2024</a:t>
             </a:fld>
             <a:endParaRPr lang="en-US"/>
           </a:p>
@@ -452,7 +458,7 @@
           <a:p>
             <a:fld id="{10C9CC9A-FA46-4C53-916D-8D99362726E6}" type="datetimeFigureOut">
               <a:rPr lang="en-US" smtClean="0"/>
-              <a:t>5/2/2021</a:t>
+              <a:t>7/2/2024</a:t>
             </a:fld>
             <a:endParaRPr lang="en-US"/>
           </a:p>
@@ -660,7 +666,7 @@
           <a:p>
             <a:fld id="{10C9CC9A-FA46-4C53-916D-8D99362726E6}" type="datetimeFigureOut">
               <a:rPr lang="en-US" smtClean="0"/>
-              <a:t>5/2/2021</a:t>
+              <a:t>7/2/2024</a:t>
             </a:fld>
             <a:endParaRPr lang="en-US"/>
           </a:p>
@@ -858,7 +864,7 @@
           <a:p>
             <a:fld id="{10C9CC9A-FA46-4C53-916D-8D99362726E6}" type="datetimeFigureOut">
               <a:rPr lang="en-US" smtClean="0"/>
-              <a:t>5/2/2021</a:t>
+              <a:t>7/2/2024</a:t>
             </a:fld>
             <a:endParaRPr lang="en-US"/>
           </a:p>
@@ -1133,7 +1139,7 @@
           <a:p>
             <a:fld id="{10C9CC9A-FA46-4C53-916D-8D99362726E6}" type="datetimeFigureOut">
               <a:rPr lang="en-US" smtClean="0"/>
-              <a:t>5/2/2021</a:t>
+              <a:t>7/2/2024</a:t>
             </a:fld>
             <a:endParaRPr lang="en-US"/>
           </a:p>
@@ -1398,7 +1404,7 @@
           <a:p>
             <a:fld id="{10C9CC9A-FA46-4C53-916D-8D99362726E6}" type="datetimeFigureOut">
               <a:rPr lang="en-US" smtClean="0"/>
-              <a:t>5/2/2021</a:t>
+              <a:t>7/2/2024</a:t>
             </a:fld>
             <a:endParaRPr lang="en-US"/>
           </a:p>
@@ -1810,7 +1816,7 @@
           <a:p>
             <a:fld id="{10C9CC9A-FA46-4C53-916D-8D99362726E6}" type="datetimeFigureOut">
               <a:rPr lang="en-US" smtClean="0"/>
-              <a:t>5/2/2021</a:t>
+              <a:t>7/2/2024</a:t>
             </a:fld>
             <a:endParaRPr lang="en-US"/>
           </a:p>
@@ -1951,7 +1957,7 @@
           <a:p>
             <a:fld id="{10C9CC9A-FA46-4C53-916D-8D99362726E6}" type="datetimeFigureOut">
               <a:rPr lang="en-US" smtClean="0"/>
-              <a:t>5/2/2021</a:t>
+              <a:t>7/2/2024</a:t>
             </a:fld>
             <a:endParaRPr lang="en-US"/>
           </a:p>
@@ -2064,7 +2070,7 @@
           <a:p>
             <a:fld id="{10C9CC9A-FA46-4C53-916D-8D99362726E6}" type="datetimeFigureOut">
               <a:rPr lang="en-US" smtClean="0"/>
-              <a:t>5/2/2021</a:t>
+              <a:t>7/2/2024</a:t>
             </a:fld>
             <a:endParaRPr lang="en-US"/>
           </a:p>
@@ -2375,7 +2381,7 @@
           <a:p>
             <a:fld id="{10C9CC9A-FA46-4C53-916D-8D99362726E6}" type="datetimeFigureOut">
               <a:rPr lang="en-US" smtClean="0"/>
-              <a:t>5/2/2021</a:t>
+              <a:t>7/2/2024</a:t>
             </a:fld>
             <a:endParaRPr lang="en-US"/>
           </a:p>
@@ -2663,7 +2669,7 @@
           <a:p>
             <a:fld id="{10C9CC9A-FA46-4C53-916D-8D99362726E6}" type="datetimeFigureOut">
               <a:rPr lang="en-US" smtClean="0"/>
-              <a:t>5/2/2021</a:t>
+              <a:t>7/2/2024</a:t>
             </a:fld>
             <a:endParaRPr lang="en-US"/>
           </a:p>
@@ -2904,7 +2910,7 @@
           <a:p>
             <a:fld id="{10C9CC9A-FA46-4C53-916D-8D99362726E6}" type="datetimeFigureOut">
               <a:rPr lang="en-US" smtClean="0"/>
-              <a:t>5/2/2021</a:t>
+              <a:t>7/2/2024</a:t>
             </a:fld>
             <a:endParaRPr lang="en-US"/>
           </a:p>
@@ -3639,7 +3645,7 @@
               <a:lstStyle/>
               <a:p>
                 <a:pPr algn="ctr"/>
-                <a:endParaRPr lang="en-US"/>
+                <a:endParaRPr lang="en-US" dirty="0"/>
               </a:p>
             </p:txBody>
           </p:sp>
@@ -4637,6 +4643,2286 @@
 </p:sld>
 </file>
 
+<file path=ppt/slides/slide2.xml><?xml version="1.0" encoding="utf-8"?>
+<p:sld xmlns:a="http://schemas.openxmlformats.org/drawingml/2006/main" xmlns:r="http://schemas.openxmlformats.org/officeDocument/2006/relationships" xmlns:p="http://schemas.openxmlformats.org/presentationml/2006/main">
+  <p:cSld>
+    <p:spTree>
+      <p:nvGrpSpPr>
+        <p:cNvPr id="1" name=""/>
+        <p:cNvGrpSpPr/>
+        <p:nvPr/>
+      </p:nvGrpSpPr>
+      <p:grpSpPr>
+        <a:xfrm>
+          <a:off x="0" y="0"/>
+          <a:ext cx="0" cy="0"/>
+          <a:chOff x="0" y="0"/>
+          <a:chExt cx="0" cy="0"/>
+        </a:xfrm>
+      </p:grpSpPr>
+      <p:grpSp>
+        <p:nvGrpSpPr>
+          <p:cNvPr id="13" name="Group 12">
+            <a:extLst>
+              <a:ext uri="{FF2B5EF4-FFF2-40B4-BE49-F238E27FC236}">
+                <a16:creationId xmlns:a16="http://schemas.microsoft.com/office/drawing/2014/main" id="{9B372523-4E46-8D85-FDED-3E863C7A6CB3}"/>
+              </a:ext>
+            </a:extLst>
+          </p:cNvPr>
+          <p:cNvGrpSpPr/>
+          <p:nvPr/>
+        </p:nvGrpSpPr>
+        <p:grpSpPr>
+          <a:xfrm>
+            <a:off x="1717767" y="2710542"/>
+            <a:ext cx="1668777" cy="2684417"/>
+            <a:chOff x="4144182" y="390578"/>
+            <a:chExt cx="2710549" cy="3717690"/>
+          </a:xfrm>
+        </p:grpSpPr>
+        <p:sp>
+          <p:nvSpPr>
+            <p:cNvPr id="6" name="Flowchart: Magnetic Disk 5">
+              <a:extLst>
+                <a:ext uri="{FF2B5EF4-FFF2-40B4-BE49-F238E27FC236}">
+                  <a16:creationId xmlns:a16="http://schemas.microsoft.com/office/drawing/2014/main" id="{84785853-9B3D-5E52-08F9-A9D0326568D7}"/>
+                </a:ext>
+              </a:extLst>
+            </p:cNvPr>
+            <p:cNvSpPr/>
+            <p:nvPr/>
+          </p:nvSpPr>
+          <p:spPr>
+            <a:xfrm>
+              <a:off x="4173583" y="470263"/>
+              <a:ext cx="2651760" cy="3638005"/>
+            </a:xfrm>
+            <a:prstGeom prst="flowChartMagneticDisk">
+              <a:avLst/>
+            </a:prstGeom>
+            <a:noFill/>
+          </p:spPr>
+          <p:style>
+            <a:lnRef idx="2">
+              <a:schemeClr val="accent1">
+                <a:shade val="15000"/>
+              </a:schemeClr>
+            </a:lnRef>
+            <a:fillRef idx="1">
+              <a:schemeClr val="accent1"/>
+            </a:fillRef>
+            <a:effectRef idx="0">
+              <a:schemeClr val="accent1"/>
+            </a:effectRef>
+            <a:fontRef idx="minor">
+              <a:schemeClr val="lt1"/>
+            </a:fontRef>
+          </p:style>
+          <p:txBody>
+            <a:bodyPr rtlCol="0" anchor="ctr"/>
+            <a:lstStyle/>
+            <a:p>
+              <a:pPr algn="ctr"/>
+              <a:endParaRPr lang="en-US"/>
+            </a:p>
+          </p:txBody>
+        </p:sp>
+        <p:sp>
+          <p:nvSpPr>
+            <p:cNvPr id="9" name="Rectangle: Top Corners Rounded 8">
+              <a:extLst>
+                <a:ext uri="{FF2B5EF4-FFF2-40B4-BE49-F238E27FC236}">
+                  <a16:creationId xmlns:a16="http://schemas.microsoft.com/office/drawing/2014/main" id="{034EBDFE-0E1B-8559-50B4-C5C313E36F57}"/>
+                </a:ext>
+              </a:extLst>
+            </p:cNvPr>
+            <p:cNvSpPr/>
+            <p:nvPr/>
+          </p:nvSpPr>
+          <p:spPr>
+            <a:xfrm rot="10800000">
+              <a:off x="4173578" y="2122713"/>
+              <a:ext cx="2651759" cy="1985552"/>
+            </a:xfrm>
+            <a:prstGeom prst="round2SameRect">
+              <a:avLst/>
+            </a:prstGeom>
+            <a:gradFill flip="none" rotWithShape="1">
+              <a:gsLst>
+                <a:gs pos="0">
+                  <a:schemeClr val="accent4">
+                    <a:lumMod val="60000"/>
+                    <a:lumOff val="40000"/>
+                    <a:shade val="30000"/>
+                    <a:satMod val="115000"/>
+                  </a:schemeClr>
+                </a:gs>
+                <a:gs pos="50000">
+                  <a:schemeClr val="accent4">
+                    <a:lumMod val="60000"/>
+                    <a:lumOff val="40000"/>
+                    <a:shade val="67500"/>
+                    <a:satMod val="115000"/>
+                  </a:schemeClr>
+                </a:gs>
+                <a:gs pos="100000">
+                  <a:schemeClr val="accent4">
+                    <a:lumMod val="60000"/>
+                    <a:lumOff val="40000"/>
+                    <a:shade val="100000"/>
+                    <a:satMod val="115000"/>
+                  </a:schemeClr>
+                </a:gs>
+              </a:gsLst>
+              <a:lin ang="5400000" scaled="1"/>
+              <a:tileRect/>
+            </a:gradFill>
+          </p:spPr>
+          <p:style>
+            <a:lnRef idx="2">
+              <a:schemeClr val="accent1">
+                <a:shade val="15000"/>
+              </a:schemeClr>
+            </a:lnRef>
+            <a:fillRef idx="1">
+              <a:schemeClr val="accent1"/>
+            </a:fillRef>
+            <a:effectRef idx="0">
+              <a:schemeClr val="accent1"/>
+            </a:effectRef>
+            <a:fontRef idx="minor">
+              <a:schemeClr val="lt1"/>
+            </a:fontRef>
+          </p:style>
+          <p:txBody>
+            <a:bodyPr rtlCol="0" anchor="ctr"/>
+            <a:lstStyle/>
+            <a:p>
+              <a:pPr algn="ctr"/>
+              <a:endParaRPr lang="en-US"/>
+            </a:p>
+          </p:txBody>
+        </p:sp>
+        <p:sp>
+          <p:nvSpPr>
+            <p:cNvPr id="12" name="Flowchart: Magnetic Disk 11">
+              <a:extLst>
+                <a:ext uri="{FF2B5EF4-FFF2-40B4-BE49-F238E27FC236}">
+                  <a16:creationId xmlns:a16="http://schemas.microsoft.com/office/drawing/2014/main" id="{04AF2E74-7654-504A-7AAD-CC90D006B950}"/>
+                </a:ext>
+              </a:extLst>
+            </p:cNvPr>
+            <p:cNvSpPr/>
+            <p:nvPr/>
+          </p:nvSpPr>
+          <p:spPr>
+            <a:xfrm>
+              <a:off x="4144182" y="390578"/>
+              <a:ext cx="2710549" cy="1366375"/>
+            </a:xfrm>
+            <a:prstGeom prst="flowChartMagneticDisk">
+              <a:avLst/>
+            </a:prstGeom>
+            <a:gradFill flip="none" rotWithShape="1">
+              <a:gsLst>
+                <a:gs pos="0">
+                  <a:schemeClr val="bg1">
+                    <a:lumMod val="65000"/>
+                    <a:tint val="66000"/>
+                    <a:satMod val="160000"/>
+                  </a:schemeClr>
+                </a:gs>
+                <a:gs pos="50000">
+                  <a:schemeClr val="bg1">
+                    <a:lumMod val="65000"/>
+                    <a:tint val="44500"/>
+                    <a:satMod val="160000"/>
+                  </a:schemeClr>
+                </a:gs>
+                <a:gs pos="100000">
+                  <a:schemeClr val="bg1">
+                    <a:lumMod val="65000"/>
+                    <a:tint val="23500"/>
+                    <a:satMod val="160000"/>
+                  </a:schemeClr>
+                </a:gs>
+              </a:gsLst>
+              <a:lin ang="5400000" scaled="1"/>
+              <a:tileRect/>
+            </a:gradFill>
+          </p:spPr>
+          <p:style>
+            <a:lnRef idx="2">
+              <a:schemeClr val="accent1">
+                <a:shade val="15000"/>
+              </a:schemeClr>
+            </a:lnRef>
+            <a:fillRef idx="1">
+              <a:schemeClr val="accent1"/>
+            </a:fillRef>
+            <a:effectRef idx="0">
+              <a:schemeClr val="accent1"/>
+            </a:effectRef>
+            <a:fontRef idx="minor">
+              <a:schemeClr val="lt1"/>
+            </a:fontRef>
+          </p:style>
+          <p:txBody>
+            <a:bodyPr rtlCol="0" anchor="ctr"/>
+            <a:lstStyle/>
+            <a:p>
+              <a:pPr algn="ctr"/>
+              <a:endParaRPr lang="en-US"/>
+            </a:p>
+          </p:txBody>
+        </p:sp>
+      </p:grpSp>
+      <p:grpSp>
+        <p:nvGrpSpPr>
+          <p:cNvPr id="14" name="Group 13">
+            <a:extLst>
+              <a:ext uri="{FF2B5EF4-FFF2-40B4-BE49-F238E27FC236}">
+                <a16:creationId xmlns:a16="http://schemas.microsoft.com/office/drawing/2014/main" id="{EC310160-0218-5BF1-E873-E6A1CC71E91C}"/>
+              </a:ext>
+            </a:extLst>
+          </p:cNvPr>
+          <p:cNvGrpSpPr/>
+          <p:nvPr/>
+        </p:nvGrpSpPr>
+        <p:grpSpPr>
+          <a:xfrm rot="4026222">
+            <a:off x="4919864" y="621798"/>
+            <a:ext cx="1644785" cy="2626879"/>
+            <a:chOff x="4153767" y="470263"/>
+            <a:chExt cx="2671576" cy="3638005"/>
+          </a:xfrm>
+        </p:grpSpPr>
+        <p:sp>
+          <p:nvSpPr>
+            <p:cNvPr id="15" name="Flowchart: Magnetic Disk 14">
+              <a:extLst>
+                <a:ext uri="{FF2B5EF4-FFF2-40B4-BE49-F238E27FC236}">
+                  <a16:creationId xmlns:a16="http://schemas.microsoft.com/office/drawing/2014/main" id="{D1151848-AD4B-D532-829E-954464366F94}"/>
+                </a:ext>
+              </a:extLst>
+            </p:cNvPr>
+            <p:cNvSpPr/>
+            <p:nvPr/>
+          </p:nvSpPr>
+          <p:spPr>
+            <a:xfrm>
+              <a:off x="4173583" y="470263"/>
+              <a:ext cx="2651760" cy="3638005"/>
+            </a:xfrm>
+            <a:prstGeom prst="flowChartMagneticDisk">
+              <a:avLst/>
+            </a:prstGeom>
+            <a:noFill/>
+          </p:spPr>
+          <p:style>
+            <a:lnRef idx="2">
+              <a:schemeClr val="accent1">
+                <a:shade val="15000"/>
+              </a:schemeClr>
+            </a:lnRef>
+            <a:fillRef idx="1">
+              <a:schemeClr val="accent1"/>
+            </a:fillRef>
+            <a:effectRef idx="0">
+              <a:schemeClr val="accent1"/>
+            </a:effectRef>
+            <a:fontRef idx="minor">
+              <a:schemeClr val="lt1"/>
+            </a:fontRef>
+          </p:style>
+          <p:txBody>
+            <a:bodyPr rtlCol="0" anchor="ctr"/>
+            <a:lstStyle/>
+            <a:p>
+              <a:pPr algn="ctr"/>
+              <a:endParaRPr lang="en-US" dirty="0"/>
+            </a:p>
+          </p:txBody>
+        </p:sp>
+        <p:sp>
+          <p:nvSpPr>
+            <p:cNvPr id="16" name="Rectangle: Top Corners Rounded 15">
+              <a:extLst>
+                <a:ext uri="{FF2B5EF4-FFF2-40B4-BE49-F238E27FC236}">
+                  <a16:creationId xmlns:a16="http://schemas.microsoft.com/office/drawing/2014/main" id="{6FEDE21E-82D2-1C00-3D4A-A5A2796AC77A}"/>
+                </a:ext>
+              </a:extLst>
+            </p:cNvPr>
+            <p:cNvSpPr/>
+            <p:nvPr/>
+          </p:nvSpPr>
+          <p:spPr>
+            <a:xfrm rot="10800000">
+              <a:off x="4153767" y="1062303"/>
+              <a:ext cx="2671565" cy="3045963"/>
+            </a:xfrm>
+            <a:custGeom>
+              <a:avLst/>
+              <a:gdLst>
+                <a:gd name="connsiteX0" fmla="*/ 274135 w 1644778"/>
+                <a:gd name="connsiteY0" fmla="*/ 0 h 1655657"/>
+                <a:gd name="connsiteX1" fmla="*/ 1370643 w 1644778"/>
+                <a:gd name="connsiteY1" fmla="*/ 0 h 1655657"/>
+                <a:gd name="connsiteX2" fmla="*/ 1644778 w 1644778"/>
+                <a:gd name="connsiteY2" fmla="*/ 274135 h 1655657"/>
+                <a:gd name="connsiteX3" fmla="*/ 1644778 w 1644778"/>
+                <a:gd name="connsiteY3" fmla="*/ 1655657 h 1655657"/>
+                <a:gd name="connsiteX4" fmla="*/ 1644778 w 1644778"/>
+                <a:gd name="connsiteY4" fmla="*/ 1655657 h 1655657"/>
+                <a:gd name="connsiteX5" fmla="*/ 0 w 1644778"/>
+                <a:gd name="connsiteY5" fmla="*/ 1655657 h 1655657"/>
+                <a:gd name="connsiteX6" fmla="*/ 0 w 1644778"/>
+                <a:gd name="connsiteY6" fmla="*/ 1655657 h 1655657"/>
+                <a:gd name="connsiteX7" fmla="*/ 0 w 1644778"/>
+                <a:gd name="connsiteY7" fmla="*/ 274135 h 1655657"/>
+                <a:gd name="connsiteX8" fmla="*/ 274135 w 1644778"/>
+                <a:gd name="connsiteY8" fmla="*/ 0 h 1655657"/>
+                <a:gd name="connsiteX0" fmla="*/ 274135 w 1644778"/>
+                <a:gd name="connsiteY0" fmla="*/ 0 h 2068162"/>
+                <a:gd name="connsiteX1" fmla="*/ 1370643 w 1644778"/>
+                <a:gd name="connsiteY1" fmla="*/ 0 h 2068162"/>
+                <a:gd name="connsiteX2" fmla="*/ 1644778 w 1644778"/>
+                <a:gd name="connsiteY2" fmla="*/ 274135 h 2068162"/>
+                <a:gd name="connsiteX3" fmla="*/ 1644778 w 1644778"/>
+                <a:gd name="connsiteY3" fmla="*/ 1655657 h 2068162"/>
+                <a:gd name="connsiteX4" fmla="*/ 1644778 w 1644778"/>
+                <a:gd name="connsiteY4" fmla="*/ 1655657 h 2068162"/>
+                <a:gd name="connsiteX5" fmla="*/ 0 w 1644778"/>
+                <a:gd name="connsiteY5" fmla="*/ 1655657 h 2068162"/>
+                <a:gd name="connsiteX6" fmla="*/ 3035 w 1644778"/>
+                <a:gd name="connsiteY6" fmla="*/ 2068162 h 2068162"/>
+                <a:gd name="connsiteX7" fmla="*/ 0 w 1644778"/>
+                <a:gd name="connsiteY7" fmla="*/ 274135 h 2068162"/>
+                <a:gd name="connsiteX8" fmla="*/ 274135 w 1644778"/>
+                <a:gd name="connsiteY8" fmla="*/ 0 h 2068162"/>
+                <a:gd name="connsiteX0" fmla="*/ 274135 w 1646541"/>
+                <a:gd name="connsiteY0" fmla="*/ 0 h 2068162"/>
+                <a:gd name="connsiteX1" fmla="*/ 1370643 w 1646541"/>
+                <a:gd name="connsiteY1" fmla="*/ 0 h 2068162"/>
+                <a:gd name="connsiteX2" fmla="*/ 1644778 w 1646541"/>
+                <a:gd name="connsiteY2" fmla="*/ 274135 h 2068162"/>
+                <a:gd name="connsiteX3" fmla="*/ 1644778 w 1646541"/>
+                <a:gd name="connsiteY3" fmla="*/ 1655657 h 2068162"/>
+                <a:gd name="connsiteX4" fmla="*/ 1644778 w 1646541"/>
+                <a:gd name="connsiteY4" fmla="*/ 1655657 h 2068162"/>
+                <a:gd name="connsiteX5" fmla="*/ 1646541 w 1646541"/>
+                <a:gd name="connsiteY5" fmla="*/ 1634963 h 2068162"/>
+                <a:gd name="connsiteX6" fmla="*/ 3035 w 1646541"/>
+                <a:gd name="connsiteY6" fmla="*/ 2068162 h 2068162"/>
+                <a:gd name="connsiteX7" fmla="*/ 0 w 1646541"/>
+                <a:gd name="connsiteY7" fmla="*/ 274135 h 2068162"/>
+                <a:gd name="connsiteX8" fmla="*/ 274135 w 1646541"/>
+                <a:gd name="connsiteY8" fmla="*/ 0 h 2068162"/>
+                <a:gd name="connsiteX0" fmla="*/ 274135 w 1644778"/>
+                <a:gd name="connsiteY0" fmla="*/ 0 h 2068162"/>
+                <a:gd name="connsiteX1" fmla="*/ 1370643 w 1644778"/>
+                <a:gd name="connsiteY1" fmla="*/ 0 h 2068162"/>
+                <a:gd name="connsiteX2" fmla="*/ 1644778 w 1644778"/>
+                <a:gd name="connsiteY2" fmla="*/ 274135 h 2068162"/>
+                <a:gd name="connsiteX3" fmla="*/ 1644778 w 1644778"/>
+                <a:gd name="connsiteY3" fmla="*/ 1655657 h 2068162"/>
+                <a:gd name="connsiteX4" fmla="*/ 1644778 w 1644778"/>
+                <a:gd name="connsiteY4" fmla="*/ 1655657 h 2068162"/>
+                <a:gd name="connsiteX5" fmla="*/ 1633490 w 1644778"/>
+                <a:gd name="connsiteY5" fmla="*/ 1143086 h 2068162"/>
+                <a:gd name="connsiteX6" fmla="*/ 3035 w 1644778"/>
+                <a:gd name="connsiteY6" fmla="*/ 2068162 h 2068162"/>
+                <a:gd name="connsiteX7" fmla="*/ 0 w 1644778"/>
+                <a:gd name="connsiteY7" fmla="*/ 274135 h 2068162"/>
+                <a:gd name="connsiteX8" fmla="*/ 274135 w 1644778"/>
+                <a:gd name="connsiteY8" fmla="*/ 0 h 2068162"/>
+                <a:gd name="connsiteX0" fmla="*/ 274135 w 1644778"/>
+                <a:gd name="connsiteY0" fmla="*/ 0 h 2068162"/>
+                <a:gd name="connsiteX1" fmla="*/ 1370643 w 1644778"/>
+                <a:gd name="connsiteY1" fmla="*/ 0 h 2068162"/>
+                <a:gd name="connsiteX2" fmla="*/ 1644778 w 1644778"/>
+                <a:gd name="connsiteY2" fmla="*/ 274135 h 2068162"/>
+                <a:gd name="connsiteX3" fmla="*/ 1644778 w 1644778"/>
+                <a:gd name="connsiteY3" fmla="*/ 1655657 h 2068162"/>
+                <a:gd name="connsiteX4" fmla="*/ 1636809 w 1644778"/>
+                <a:gd name="connsiteY4" fmla="*/ 1152465 h 2068162"/>
+                <a:gd name="connsiteX5" fmla="*/ 1633490 w 1644778"/>
+                <a:gd name="connsiteY5" fmla="*/ 1143086 h 2068162"/>
+                <a:gd name="connsiteX6" fmla="*/ 3035 w 1644778"/>
+                <a:gd name="connsiteY6" fmla="*/ 2068162 h 2068162"/>
+                <a:gd name="connsiteX7" fmla="*/ 0 w 1644778"/>
+                <a:gd name="connsiteY7" fmla="*/ 274135 h 2068162"/>
+                <a:gd name="connsiteX8" fmla="*/ 274135 w 1644778"/>
+                <a:gd name="connsiteY8" fmla="*/ 0 h 2068162"/>
+                <a:gd name="connsiteX0" fmla="*/ 274135 w 1644778"/>
+                <a:gd name="connsiteY0" fmla="*/ 0 h 2068162"/>
+                <a:gd name="connsiteX1" fmla="*/ 1370643 w 1644778"/>
+                <a:gd name="connsiteY1" fmla="*/ 0 h 2068162"/>
+                <a:gd name="connsiteX2" fmla="*/ 1644778 w 1644778"/>
+                <a:gd name="connsiteY2" fmla="*/ 274135 h 2068162"/>
+                <a:gd name="connsiteX3" fmla="*/ 1625711 w 1644778"/>
+                <a:gd name="connsiteY3" fmla="*/ 1161392 h 2068162"/>
+                <a:gd name="connsiteX4" fmla="*/ 1636809 w 1644778"/>
+                <a:gd name="connsiteY4" fmla="*/ 1152465 h 2068162"/>
+                <a:gd name="connsiteX5" fmla="*/ 1633490 w 1644778"/>
+                <a:gd name="connsiteY5" fmla="*/ 1143086 h 2068162"/>
+                <a:gd name="connsiteX6" fmla="*/ 3035 w 1644778"/>
+                <a:gd name="connsiteY6" fmla="*/ 2068162 h 2068162"/>
+                <a:gd name="connsiteX7" fmla="*/ 0 w 1644778"/>
+                <a:gd name="connsiteY7" fmla="*/ 274135 h 2068162"/>
+                <a:gd name="connsiteX8" fmla="*/ 274135 w 1644778"/>
+                <a:gd name="connsiteY8" fmla="*/ 0 h 2068162"/>
+              </a:gdLst>
+              <a:ahLst/>
+              <a:cxnLst>
+                <a:cxn ang="0">
+                  <a:pos x="connsiteX0" y="connsiteY0"/>
+                </a:cxn>
+                <a:cxn ang="0">
+                  <a:pos x="connsiteX1" y="connsiteY1"/>
+                </a:cxn>
+                <a:cxn ang="0">
+                  <a:pos x="connsiteX2" y="connsiteY2"/>
+                </a:cxn>
+                <a:cxn ang="0">
+                  <a:pos x="connsiteX3" y="connsiteY3"/>
+                </a:cxn>
+                <a:cxn ang="0">
+                  <a:pos x="connsiteX4" y="connsiteY4"/>
+                </a:cxn>
+                <a:cxn ang="0">
+                  <a:pos x="connsiteX5" y="connsiteY5"/>
+                </a:cxn>
+                <a:cxn ang="0">
+                  <a:pos x="connsiteX6" y="connsiteY6"/>
+                </a:cxn>
+                <a:cxn ang="0">
+                  <a:pos x="connsiteX7" y="connsiteY7"/>
+                </a:cxn>
+                <a:cxn ang="0">
+                  <a:pos x="connsiteX8" y="connsiteY8"/>
+                </a:cxn>
+              </a:cxnLst>
+              <a:rect l="l" t="t" r="r" b="b"/>
+              <a:pathLst>
+                <a:path w="1644778" h="2068162">
+                  <a:moveTo>
+                    <a:pt x="274135" y="0"/>
+                  </a:moveTo>
+                  <a:lnTo>
+                    <a:pt x="1370643" y="0"/>
+                  </a:lnTo>
+                  <a:cubicBezTo>
+                    <a:pt x="1522044" y="0"/>
+                    <a:pt x="1644778" y="122734"/>
+                    <a:pt x="1644778" y="274135"/>
+                  </a:cubicBezTo>
+                  <a:lnTo>
+                    <a:pt x="1625711" y="1161392"/>
+                  </a:lnTo>
+                  <a:lnTo>
+                    <a:pt x="1636809" y="1152465"/>
+                  </a:lnTo>
+                  <a:lnTo>
+                    <a:pt x="1633490" y="1143086"/>
+                  </a:lnTo>
+                  <a:cubicBezTo>
+                    <a:pt x="1634502" y="1280588"/>
+                    <a:pt x="2023" y="1930660"/>
+                    <a:pt x="3035" y="2068162"/>
+                  </a:cubicBezTo>
+                  <a:cubicBezTo>
+                    <a:pt x="3035" y="1607655"/>
+                    <a:pt x="0" y="734642"/>
+                    <a:pt x="0" y="274135"/>
+                  </a:cubicBezTo>
+                  <a:cubicBezTo>
+                    <a:pt x="0" y="122734"/>
+                    <a:pt x="122734" y="0"/>
+                    <a:pt x="274135" y="0"/>
+                  </a:cubicBezTo>
+                  <a:close/>
+                </a:path>
+              </a:pathLst>
+            </a:custGeom>
+            <a:gradFill flip="none" rotWithShape="1">
+              <a:gsLst>
+                <a:gs pos="0">
+                  <a:schemeClr val="accent4">
+                    <a:lumMod val="60000"/>
+                    <a:lumOff val="40000"/>
+                    <a:shade val="30000"/>
+                    <a:satMod val="115000"/>
+                  </a:schemeClr>
+                </a:gs>
+                <a:gs pos="50000">
+                  <a:schemeClr val="accent4">
+                    <a:lumMod val="60000"/>
+                    <a:lumOff val="40000"/>
+                    <a:shade val="67500"/>
+                    <a:satMod val="115000"/>
+                  </a:schemeClr>
+                </a:gs>
+                <a:gs pos="100000">
+                  <a:schemeClr val="accent4">
+                    <a:lumMod val="60000"/>
+                    <a:lumOff val="40000"/>
+                    <a:shade val="100000"/>
+                    <a:satMod val="115000"/>
+                  </a:schemeClr>
+                </a:gs>
+              </a:gsLst>
+              <a:lin ang="5400000" scaled="1"/>
+              <a:tileRect/>
+            </a:gradFill>
+          </p:spPr>
+          <p:style>
+            <a:lnRef idx="2">
+              <a:schemeClr val="accent1">
+                <a:shade val="15000"/>
+              </a:schemeClr>
+            </a:lnRef>
+            <a:fillRef idx="1">
+              <a:schemeClr val="accent1"/>
+            </a:fillRef>
+            <a:effectRef idx="0">
+              <a:schemeClr val="accent1"/>
+            </a:effectRef>
+            <a:fontRef idx="minor">
+              <a:schemeClr val="lt1"/>
+            </a:fontRef>
+          </p:style>
+          <p:txBody>
+            <a:bodyPr rtlCol="0" anchor="ctr"/>
+            <a:lstStyle/>
+            <a:p>
+              <a:pPr algn="ctr"/>
+              <a:endParaRPr lang="en-US" dirty="0"/>
+            </a:p>
+          </p:txBody>
+        </p:sp>
+      </p:grpSp>
+      <p:grpSp>
+        <p:nvGrpSpPr>
+          <p:cNvPr id="45" name="Group 44">
+            <a:extLst>
+              <a:ext uri="{FF2B5EF4-FFF2-40B4-BE49-F238E27FC236}">
+                <a16:creationId xmlns:a16="http://schemas.microsoft.com/office/drawing/2014/main" id="{B0AC6B97-F297-2102-0C4C-30A19188DA9A}"/>
+              </a:ext>
+            </a:extLst>
+          </p:cNvPr>
+          <p:cNvGrpSpPr/>
+          <p:nvPr/>
+        </p:nvGrpSpPr>
+        <p:grpSpPr>
+          <a:xfrm>
+            <a:off x="6764579" y="2339439"/>
+            <a:ext cx="2945216" cy="2420283"/>
+            <a:chOff x="5656675" y="2140069"/>
+            <a:chExt cx="5345155" cy="4241472"/>
+          </a:xfrm>
+          <a:solidFill>
+            <a:schemeClr val="bg2"/>
+          </a:solidFill>
+        </p:grpSpPr>
+        <p:sp>
+          <p:nvSpPr>
+            <p:cNvPr id="39" name="Flowchart: Delay 38">
+              <a:extLst>
+                <a:ext uri="{FF2B5EF4-FFF2-40B4-BE49-F238E27FC236}">
+                  <a16:creationId xmlns:a16="http://schemas.microsoft.com/office/drawing/2014/main" id="{B02F5EA5-E8ED-64ED-5C53-E51314467EB6}"/>
+                </a:ext>
+              </a:extLst>
+            </p:cNvPr>
+            <p:cNvSpPr/>
+            <p:nvPr/>
+          </p:nvSpPr>
+          <p:spPr>
+            <a:xfrm rot="19424623">
+              <a:off x="7287829" y="2423244"/>
+              <a:ext cx="2799450" cy="612648"/>
+            </a:xfrm>
+            <a:prstGeom prst="flowChartDelay">
+              <a:avLst/>
+            </a:prstGeom>
+            <a:grpFill/>
+            <a:ln>
+              <a:noFill/>
+            </a:ln>
+          </p:spPr>
+          <p:style>
+            <a:lnRef idx="2">
+              <a:schemeClr val="accent1">
+                <a:shade val="15000"/>
+              </a:schemeClr>
+            </a:lnRef>
+            <a:fillRef idx="1">
+              <a:schemeClr val="accent1"/>
+            </a:fillRef>
+            <a:effectRef idx="0">
+              <a:schemeClr val="accent1"/>
+            </a:effectRef>
+            <a:fontRef idx="minor">
+              <a:schemeClr val="lt1"/>
+            </a:fontRef>
+          </p:style>
+          <p:txBody>
+            <a:bodyPr rtlCol="0" anchor="ctr"/>
+            <a:lstStyle/>
+            <a:p>
+              <a:pPr algn="ctr"/>
+              <a:endParaRPr lang="en-US"/>
+            </a:p>
+          </p:txBody>
+        </p:sp>
+        <p:sp>
+          <p:nvSpPr>
+            <p:cNvPr id="40" name="Flowchart: Delay 39">
+              <a:extLst>
+                <a:ext uri="{FF2B5EF4-FFF2-40B4-BE49-F238E27FC236}">
+                  <a16:creationId xmlns:a16="http://schemas.microsoft.com/office/drawing/2014/main" id="{C32027D5-B621-9129-268E-32A12ED34347}"/>
+                </a:ext>
+              </a:extLst>
+            </p:cNvPr>
+            <p:cNvSpPr/>
+            <p:nvPr/>
+          </p:nvSpPr>
+          <p:spPr>
+            <a:xfrm rot="19424623">
+              <a:off x="7604843" y="2784307"/>
+              <a:ext cx="3396987" cy="612648"/>
+            </a:xfrm>
+            <a:prstGeom prst="flowChartDelay">
+              <a:avLst/>
+            </a:prstGeom>
+            <a:grpFill/>
+            <a:ln>
+              <a:noFill/>
+            </a:ln>
+          </p:spPr>
+          <p:style>
+            <a:lnRef idx="2">
+              <a:schemeClr val="accent1">
+                <a:shade val="15000"/>
+              </a:schemeClr>
+            </a:lnRef>
+            <a:fillRef idx="1">
+              <a:schemeClr val="accent1"/>
+            </a:fillRef>
+            <a:effectRef idx="0">
+              <a:schemeClr val="accent1"/>
+            </a:effectRef>
+            <a:fontRef idx="minor">
+              <a:schemeClr val="lt1"/>
+            </a:fontRef>
+          </p:style>
+          <p:txBody>
+            <a:bodyPr rtlCol="0" anchor="ctr"/>
+            <a:lstStyle/>
+            <a:p>
+              <a:pPr algn="ctr"/>
+              <a:endParaRPr lang="en-US"/>
+            </a:p>
+          </p:txBody>
+        </p:sp>
+        <p:sp>
+          <p:nvSpPr>
+            <p:cNvPr id="41" name="Flowchart: Delay 40">
+              <a:extLst>
+                <a:ext uri="{FF2B5EF4-FFF2-40B4-BE49-F238E27FC236}">
+                  <a16:creationId xmlns:a16="http://schemas.microsoft.com/office/drawing/2014/main" id="{18898129-CEBA-42D9-054E-ACC46955D284}"/>
+                </a:ext>
+              </a:extLst>
+            </p:cNvPr>
+            <p:cNvSpPr/>
+            <p:nvPr/>
+          </p:nvSpPr>
+          <p:spPr>
+            <a:xfrm rot="19424623">
+              <a:off x="8037554" y="3498053"/>
+              <a:ext cx="2799450" cy="612648"/>
+            </a:xfrm>
+            <a:prstGeom prst="flowChartDelay">
+              <a:avLst/>
+            </a:prstGeom>
+            <a:grpFill/>
+            <a:ln>
+              <a:noFill/>
+            </a:ln>
+          </p:spPr>
+          <p:style>
+            <a:lnRef idx="2">
+              <a:schemeClr val="accent1">
+                <a:shade val="15000"/>
+              </a:schemeClr>
+            </a:lnRef>
+            <a:fillRef idx="1">
+              <a:schemeClr val="accent1"/>
+            </a:fillRef>
+            <a:effectRef idx="0">
+              <a:schemeClr val="accent1"/>
+            </a:effectRef>
+            <a:fontRef idx="minor">
+              <a:schemeClr val="lt1"/>
+            </a:fontRef>
+          </p:style>
+          <p:txBody>
+            <a:bodyPr rtlCol="0" anchor="ctr"/>
+            <a:lstStyle/>
+            <a:p>
+              <a:pPr algn="ctr"/>
+              <a:endParaRPr lang="en-US"/>
+            </a:p>
+          </p:txBody>
+        </p:sp>
+        <p:sp>
+          <p:nvSpPr>
+            <p:cNvPr id="42" name="Flowchart: Delay 41">
+              <a:extLst>
+                <a:ext uri="{FF2B5EF4-FFF2-40B4-BE49-F238E27FC236}">
+                  <a16:creationId xmlns:a16="http://schemas.microsoft.com/office/drawing/2014/main" id="{4CF0BF83-DC5B-0E42-4581-EEFF7455CA01}"/>
+                </a:ext>
+              </a:extLst>
+            </p:cNvPr>
+            <p:cNvSpPr/>
+            <p:nvPr/>
+          </p:nvSpPr>
+          <p:spPr>
+            <a:xfrm rot="19424623">
+              <a:off x="7471496" y="4729743"/>
+              <a:ext cx="2799450" cy="612648"/>
+            </a:xfrm>
+            <a:prstGeom prst="flowChartDelay">
+              <a:avLst/>
+            </a:prstGeom>
+            <a:grpFill/>
+            <a:ln>
+              <a:noFill/>
+            </a:ln>
+          </p:spPr>
+          <p:style>
+            <a:lnRef idx="2">
+              <a:schemeClr val="accent1">
+                <a:shade val="15000"/>
+              </a:schemeClr>
+            </a:lnRef>
+            <a:fillRef idx="1">
+              <a:schemeClr val="accent1"/>
+            </a:fillRef>
+            <a:effectRef idx="0">
+              <a:schemeClr val="accent1"/>
+            </a:effectRef>
+            <a:fontRef idx="minor">
+              <a:schemeClr val="lt1"/>
+            </a:fontRef>
+          </p:style>
+          <p:txBody>
+            <a:bodyPr rtlCol="0" anchor="ctr"/>
+            <a:lstStyle/>
+            <a:p>
+              <a:pPr algn="ctr"/>
+              <a:endParaRPr lang="en-US"/>
+            </a:p>
+          </p:txBody>
+        </p:sp>
+        <p:sp>
+          <p:nvSpPr>
+            <p:cNvPr id="43" name="Flowchart: Delay 42">
+              <a:extLst>
+                <a:ext uri="{FF2B5EF4-FFF2-40B4-BE49-F238E27FC236}">
+                  <a16:creationId xmlns:a16="http://schemas.microsoft.com/office/drawing/2014/main" id="{79F8E7D2-3EF6-CF6B-39F0-11A8E748E413}"/>
+                </a:ext>
+              </a:extLst>
+            </p:cNvPr>
+            <p:cNvSpPr/>
+            <p:nvPr/>
+          </p:nvSpPr>
+          <p:spPr>
+            <a:xfrm rot="19424623">
+              <a:off x="6950570" y="2140069"/>
+              <a:ext cx="1973459" cy="612648"/>
+            </a:xfrm>
+            <a:prstGeom prst="flowChartDelay">
+              <a:avLst/>
+            </a:prstGeom>
+            <a:grpFill/>
+            <a:ln>
+              <a:noFill/>
+            </a:ln>
+          </p:spPr>
+          <p:style>
+            <a:lnRef idx="2">
+              <a:schemeClr val="accent1">
+                <a:shade val="15000"/>
+              </a:schemeClr>
+            </a:lnRef>
+            <a:fillRef idx="1">
+              <a:schemeClr val="accent1"/>
+            </a:fillRef>
+            <a:effectRef idx="0">
+              <a:schemeClr val="accent1"/>
+            </a:effectRef>
+            <a:fontRef idx="minor">
+              <a:schemeClr val="lt1"/>
+            </a:fontRef>
+          </p:style>
+          <p:txBody>
+            <a:bodyPr rtlCol="0" anchor="ctr"/>
+            <a:lstStyle/>
+            <a:p>
+              <a:pPr algn="ctr"/>
+              <a:endParaRPr lang="en-US"/>
+            </a:p>
+          </p:txBody>
+        </p:sp>
+        <p:sp>
+          <p:nvSpPr>
+            <p:cNvPr id="44" name="Flowchart: Delay 43">
+              <a:extLst>
+                <a:ext uri="{FF2B5EF4-FFF2-40B4-BE49-F238E27FC236}">
+                  <a16:creationId xmlns:a16="http://schemas.microsoft.com/office/drawing/2014/main" id="{213CAF87-C989-BD7C-2EDC-AE1AE00314DD}"/>
+                </a:ext>
+              </a:extLst>
+            </p:cNvPr>
+            <p:cNvSpPr/>
+            <p:nvPr/>
+          </p:nvSpPr>
+          <p:spPr>
+            <a:xfrm rot="19367733" flipH="1">
+              <a:off x="5656675" y="3125321"/>
+              <a:ext cx="2769633" cy="3256220"/>
+            </a:xfrm>
+            <a:prstGeom prst="flowChartDelay">
+              <a:avLst/>
+            </a:prstGeom>
+            <a:grpFill/>
+            <a:ln>
+              <a:noFill/>
+            </a:ln>
+          </p:spPr>
+          <p:style>
+            <a:lnRef idx="2">
+              <a:schemeClr val="accent1">
+                <a:shade val="15000"/>
+              </a:schemeClr>
+            </a:lnRef>
+            <a:fillRef idx="1">
+              <a:schemeClr val="accent1"/>
+            </a:fillRef>
+            <a:effectRef idx="0">
+              <a:schemeClr val="accent1"/>
+            </a:effectRef>
+            <a:fontRef idx="minor">
+              <a:schemeClr val="lt1"/>
+            </a:fontRef>
+          </p:style>
+          <p:txBody>
+            <a:bodyPr rtlCol="0" anchor="ctr"/>
+            <a:lstStyle/>
+            <a:p>
+              <a:pPr algn="ctr"/>
+              <a:endParaRPr lang="en-US" dirty="0"/>
+            </a:p>
+          </p:txBody>
+        </p:sp>
+      </p:grpSp>
+      <p:sp>
+        <p:nvSpPr>
+          <p:cNvPr id="49" name="Oval 48">
+            <a:extLst>
+              <a:ext uri="{FF2B5EF4-FFF2-40B4-BE49-F238E27FC236}">
+                <a16:creationId xmlns:a16="http://schemas.microsoft.com/office/drawing/2014/main" id="{12563EED-99DC-FAA3-2E35-8728615282B7}"/>
+              </a:ext>
+            </a:extLst>
+          </p:cNvPr>
+          <p:cNvSpPr/>
+          <p:nvPr/>
+        </p:nvSpPr>
+        <p:spPr>
+          <a:xfrm rot="19069669">
+            <a:off x="7109210" y="3078115"/>
+            <a:ext cx="1000174" cy="1358407"/>
+          </a:xfrm>
+          <a:prstGeom prst="ellipse">
+            <a:avLst/>
+          </a:prstGeom>
+          <a:gradFill flip="none" rotWithShape="1">
+            <a:gsLst>
+              <a:gs pos="0">
+                <a:schemeClr val="accent4">
+                  <a:lumMod val="60000"/>
+                  <a:lumOff val="40000"/>
+                  <a:shade val="30000"/>
+                  <a:satMod val="115000"/>
+                </a:schemeClr>
+              </a:gs>
+              <a:gs pos="50000">
+                <a:schemeClr val="accent4">
+                  <a:lumMod val="60000"/>
+                  <a:lumOff val="40000"/>
+                  <a:shade val="67500"/>
+                  <a:satMod val="115000"/>
+                </a:schemeClr>
+              </a:gs>
+              <a:gs pos="100000">
+                <a:schemeClr val="accent4">
+                  <a:lumMod val="60000"/>
+                  <a:lumOff val="40000"/>
+                  <a:shade val="100000"/>
+                  <a:satMod val="115000"/>
+                </a:schemeClr>
+              </a:gs>
+            </a:gsLst>
+            <a:path path="circle">
+              <a:fillToRect l="50000" t="50000" r="50000" b="50000"/>
+            </a:path>
+            <a:tileRect/>
+          </a:gradFill>
+          <a:ln>
+            <a:noFill/>
+          </a:ln>
+        </p:spPr>
+        <p:style>
+          <a:lnRef idx="2">
+            <a:schemeClr val="accent1">
+              <a:shade val="15000"/>
+            </a:schemeClr>
+          </a:lnRef>
+          <a:fillRef idx="1">
+            <a:schemeClr val="accent1"/>
+          </a:fillRef>
+          <a:effectRef idx="0">
+            <a:schemeClr val="accent1"/>
+          </a:effectRef>
+          <a:fontRef idx="minor">
+            <a:schemeClr val="lt1"/>
+          </a:fontRef>
+        </p:style>
+        <p:txBody>
+          <a:bodyPr rtlCol="0" anchor="ctr"/>
+          <a:lstStyle/>
+          <a:p>
+            <a:pPr algn="ctr"/>
+            <a:endParaRPr lang="en-US"/>
+          </a:p>
+        </p:txBody>
+      </p:sp>
+      <p:grpSp>
+        <p:nvGrpSpPr>
+          <p:cNvPr id="57" name="Group 56">
+            <a:extLst>
+              <a:ext uri="{FF2B5EF4-FFF2-40B4-BE49-F238E27FC236}">
+                <a16:creationId xmlns:a16="http://schemas.microsoft.com/office/drawing/2014/main" id="{1E367F7C-7850-E365-BC6C-EEAD5D213FEC}"/>
+              </a:ext>
+            </a:extLst>
+          </p:cNvPr>
+          <p:cNvGrpSpPr/>
+          <p:nvPr/>
+        </p:nvGrpSpPr>
+        <p:grpSpPr>
+          <a:xfrm>
+            <a:off x="9868030" y="907679"/>
+            <a:ext cx="1828800" cy="5042642"/>
+            <a:chOff x="4529138" y="1614488"/>
+            <a:chExt cx="1828800" cy="5042642"/>
+          </a:xfrm>
+        </p:grpSpPr>
+        <p:sp>
+          <p:nvSpPr>
+            <p:cNvPr id="58" name="Oval 57">
+              <a:extLst>
+                <a:ext uri="{FF2B5EF4-FFF2-40B4-BE49-F238E27FC236}">
+                  <a16:creationId xmlns:a16="http://schemas.microsoft.com/office/drawing/2014/main" id="{83D3AD06-4E6F-AB3D-95F1-821F390356E5}"/>
+                </a:ext>
+              </a:extLst>
+            </p:cNvPr>
+            <p:cNvSpPr/>
+            <p:nvPr/>
+          </p:nvSpPr>
+          <p:spPr>
+            <a:xfrm>
+              <a:off x="4986338" y="1614488"/>
+              <a:ext cx="914400" cy="914400"/>
+            </a:xfrm>
+            <a:prstGeom prst="ellipse">
+              <a:avLst/>
+            </a:prstGeom>
+            <a:solidFill>
+              <a:schemeClr val="bg1"/>
+            </a:solidFill>
+            <a:ln>
+              <a:solidFill>
+                <a:schemeClr val="tx1"/>
+              </a:solidFill>
+            </a:ln>
+          </p:spPr>
+          <p:style>
+            <a:lnRef idx="2">
+              <a:schemeClr val="accent1">
+                <a:shade val="50000"/>
+              </a:schemeClr>
+            </a:lnRef>
+            <a:fillRef idx="1">
+              <a:schemeClr val="accent1"/>
+            </a:fillRef>
+            <a:effectRef idx="0">
+              <a:schemeClr val="accent1"/>
+            </a:effectRef>
+            <a:fontRef idx="minor">
+              <a:schemeClr val="lt1"/>
+            </a:fontRef>
+          </p:style>
+          <p:txBody>
+            <a:bodyPr rtlCol="0" anchor="ctr"/>
+            <a:lstStyle/>
+            <a:p>
+              <a:pPr algn="ctr"/>
+              <a:endParaRPr lang="en-US"/>
+            </a:p>
+          </p:txBody>
+        </p:sp>
+        <p:sp>
+          <p:nvSpPr>
+            <p:cNvPr id="59" name="Arc 58">
+              <a:extLst>
+                <a:ext uri="{FF2B5EF4-FFF2-40B4-BE49-F238E27FC236}">
+                  <a16:creationId xmlns:a16="http://schemas.microsoft.com/office/drawing/2014/main" id="{B3D4E286-96F5-0DFE-CB7D-75BF924E7CF5}"/>
+                </a:ext>
+              </a:extLst>
+            </p:cNvPr>
+            <p:cNvSpPr/>
+            <p:nvPr/>
+          </p:nvSpPr>
+          <p:spPr>
+            <a:xfrm rot="5400000">
+              <a:off x="4588193" y="2208403"/>
+              <a:ext cx="796290" cy="539478"/>
+            </a:xfrm>
+            <a:prstGeom prst="arc">
+              <a:avLst/>
+            </a:prstGeom>
+            <a:ln w="12700">
+              <a:solidFill>
+                <a:schemeClr val="tx1"/>
+              </a:solidFill>
+            </a:ln>
+          </p:spPr>
+          <p:style>
+            <a:lnRef idx="1">
+              <a:schemeClr val="accent1"/>
+            </a:lnRef>
+            <a:fillRef idx="0">
+              <a:schemeClr val="accent1"/>
+            </a:fillRef>
+            <a:effectRef idx="0">
+              <a:schemeClr val="accent1"/>
+            </a:effectRef>
+            <a:fontRef idx="minor">
+              <a:schemeClr val="tx1"/>
+            </a:fontRef>
+          </p:style>
+          <p:txBody>
+            <a:bodyPr rtlCol="0" anchor="ctr"/>
+            <a:lstStyle/>
+            <a:p>
+              <a:pPr algn="ctr"/>
+              <a:endParaRPr lang="en-US"/>
+            </a:p>
+          </p:txBody>
+        </p:sp>
+        <p:grpSp>
+          <p:nvGrpSpPr>
+            <p:cNvPr id="60" name="Group 59">
+              <a:extLst>
+                <a:ext uri="{FF2B5EF4-FFF2-40B4-BE49-F238E27FC236}">
+                  <a16:creationId xmlns:a16="http://schemas.microsoft.com/office/drawing/2014/main" id="{A3AB67FC-F3F0-7E94-5E92-F18C578F048F}"/>
+                </a:ext>
+              </a:extLst>
+            </p:cNvPr>
+            <p:cNvGrpSpPr/>
+            <p:nvPr/>
+          </p:nvGrpSpPr>
+          <p:grpSpPr>
+            <a:xfrm>
+              <a:off x="4529138" y="2876287"/>
+              <a:ext cx="914400" cy="1709740"/>
+              <a:chOff x="4338637" y="2952750"/>
+              <a:chExt cx="914400" cy="1709740"/>
+            </a:xfrm>
+          </p:grpSpPr>
+          <p:sp>
+            <p:nvSpPr>
+              <p:cNvPr id="74" name="Oval 14">
+                <a:extLst>
+                  <a:ext uri="{FF2B5EF4-FFF2-40B4-BE49-F238E27FC236}">
+                    <a16:creationId xmlns:a16="http://schemas.microsoft.com/office/drawing/2014/main" id="{9AD3A16D-8496-0241-649B-8496EC148BED}"/>
+                  </a:ext>
+                </a:extLst>
+              </p:cNvPr>
+              <p:cNvSpPr/>
+              <p:nvPr/>
+            </p:nvSpPr>
+            <p:spPr>
+              <a:xfrm>
+                <a:off x="4338638" y="4445954"/>
+                <a:ext cx="420544" cy="216536"/>
+              </a:xfrm>
+              <a:custGeom>
+                <a:avLst/>
+                <a:gdLst>
+                  <a:gd name="connsiteX0" fmla="*/ 0 w 420543"/>
+                  <a:gd name="connsiteY0" fmla="*/ 211928 h 423855"/>
+                  <a:gd name="connsiteX1" fmla="*/ 210272 w 420543"/>
+                  <a:gd name="connsiteY1" fmla="*/ 0 h 423855"/>
+                  <a:gd name="connsiteX2" fmla="*/ 420544 w 420543"/>
+                  <a:gd name="connsiteY2" fmla="*/ 211928 h 423855"/>
+                  <a:gd name="connsiteX3" fmla="*/ 210272 w 420543"/>
+                  <a:gd name="connsiteY3" fmla="*/ 423856 h 423855"/>
+                  <a:gd name="connsiteX4" fmla="*/ 0 w 420543"/>
+                  <a:gd name="connsiteY4" fmla="*/ 211928 h 423855"/>
+                  <a:gd name="connsiteX0" fmla="*/ 0 w 420544"/>
+                  <a:gd name="connsiteY0" fmla="*/ 211928 h 423856"/>
+                  <a:gd name="connsiteX1" fmla="*/ 210272 w 420544"/>
+                  <a:gd name="connsiteY1" fmla="*/ 0 h 423856"/>
+                  <a:gd name="connsiteX2" fmla="*/ 420544 w 420544"/>
+                  <a:gd name="connsiteY2" fmla="*/ 211928 h 423856"/>
+                  <a:gd name="connsiteX3" fmla="*/ 210272 w 420544"/>
+                  <a:gd name="connsiteY3" fmla="*/ 423856 h 423856"/>
+                  <a:gd name="connsiteX4" fmla="*/ 0 w 420544"/>
+                  <a:gd name="connsiteY4" fmla="*/ 211928 h 423856"/>
+                  <a:gd name="connsiteX0" fmla="*/ 210272 w 420544"/>
+                  <a:gd name="connsiteY0" fmla="*/ 0 h 423856"/>
+                  <a:gd name="connsiteX1" fmla="*/ 420544 w 420544"/>
+                  <a:gd name="connsiteY1" fmla="*/ 211928 h 423856"/>
+                  <a:gd name="connsiteX2" fmla="*/ 210272 w 420544"/>
+                  <a:gd name="connsiteY2" fmla="*/ 423856 h 423856"/>
+                  <a:gd name="connsiteX3" fmla="*/ 0 w 420544"/>
+                  <a:gd name="connsiteY3" fmla="*/ 211928 h 423856"/>
+                  <a:gd name="connsiteX4" fmla="*/ 301712 w 420544"/>
+                  <a:gd name="connsiteY4" fmla="*/ 91440 h 423856"/>
+                  <a:gd name="connsiteX0" fmla="*/ 210272 w 420544"/>
+                  <a:gd name="connsiteY0" fmla="*/ 0 h 423856"/>
+                  <a:gd name="connsiteX1" fmla="*/ 420544 w 420544"/>
+                  <a:gd name="connsiteY1" fmla="*/ 211928 h 423856"/>
+                  <a:gd name="connsiteX2" fmla="*/ 210272 w 420544"/>
+                  <a:gd name="connsiteY2" fmla="*/ 423856 h 423856"/>
+                  <a:gd name="connsiteX3" fmla="*/ 0 w 420544"/>
+                  <a:gd name="connsiteY3" fmla="*/ 211928 h 423856"/>
+                  <a:gd name="connsiteX0" fmla="*/ 420544 w 420544"/>
+                  <a:gd name="connsiteY0" fmla="*/ 0 h 211928"/>
+                  <a:gd name="connsiteX1" fmla="*/ 210272 w 420544"/>
+                  <a:gd name="connsiteY1" fmla="*/ 211928 h 211928"/>
+                  <a:gd name="connsiteX2" fmla="*/ 0 w 420544"/>
+                  <a:gd name="connsiteY2" fmla="*/ 0 h 211928"/>
+                </a:gdLst>
+                <a:ahLst/>
+                <a:cxnLst>
+                  <a:cxn ang="0">
+                    <a:pos x="connsiteX0" y="connsiteY0"/>
+                  </a:cxn>
+                  <a:cxn ang="0">
+                    <a:pos x="connsiteX1" y="connsiteY1"/>
+                  </a:cxn>
+                  <a:cxn ang="0">
+                    <a:pos x="connsiteX2" y="connsiteY2"/>
+                  </a:cxn>
+                </a:cxnLst>
+                <a:rect l="l" t="t" r="r" b="b"/>
+                <a:pathLst>
+                  <a:path w="420544" h="211928">
+                    <a:moveTo>
+                      <a:pt x="420544" y="0"/>
+                    </a:moveTo>
+                    <a:cubicBezTo>
+                      <a:pt x="420544" y="117045"/>
+                      <a:pt x="326402" y="211928"/>
+                      <a:pt x="210272" y="211928"/>
+                    </a:cubicBezTo>
+                    <a:cubicBezTo>
+                      <a:pt x="94142" y="211928"/>
+                      <a:pt x="0" y="117045"/>
+                      <a:pt x="0" y="0"/>
+                    </a:cubicBezTo>
+                  </a:path>
+                </a:pathLst>
+              </a:custGeom>
+              <a:solidFill>
+                <a:schemeClr val="bg1"/>
+              </a:solidFill>
+              <a:ln>
+                <a:solidFill>
+                  <a:schemeClr val="tx1"/>
+                </a:solidFill>
+              </a:ln>
+            </p:spPr>
+            <p:style>
+              <a:lnRef idx="2">
+                <a:schemeClr val="accent1">
+                  <a:shade val="50000"/>
+                </a:schemeClr>
+              </a:lnRef>
+              <a:fillRef idx="1">
+                <a:schemeClr val="accent1"/>
+              </a:fillRef>
+              <a:effectRef idx="0">
+                <a:schemeClr val="accent1"/>
+              </a:effectRef>
+              <a:fontRef idx="minor">
+                <a:schemeClr val="lt1"/>
+              </a:fontRef>
+            </p:style>
+            <p:txBody>
+              <a:bodyPr rtlCol="0" anchor="ctr"/>
+              <a:lstStyle/>
+              <a:p>
+                <a:pPr algn="ctr"/>
+                <a:endParaRPr lang="en-US"/>
+              </a:p>
+            </p:txBody>
+          </p:sp>
+          <p:sp>
+            <p:nvSpPr>
+              <p:cNvPr id="75" name="Arc 74">
+                <a:extLst>
+                  <a:ext uri="{FF2B5EF4-FFF2-40B4-BE49-F238E27FC236}">
+                    <a16:creationId xmlns:a16="http://schemas.microsoft.com/office/drawing/2014/main" id="{F126D464-57C8-E92F-6BDF-FDF2888BF53E}"/>
+                  </a:ext>
+                </a:extLst>
+              </p:cNvPr>
+              <p:cNvSpPr/>
+              <p:nvPr/>
+            </p:nvSpPr>
+            <p:spPr>
+              <a:xfrm rot="16200000">
+                <a:off x="4338637" y="2952750"/>
+                <a:ext cx="914400" cy="914400"/>
+              </a:xfrm>
+              <a:prstGeom prst="arc">
+                <a:avLst/>
+              </a:prstGeom>
+              <a:ln w="12700">
+                <a:solidFill>
+                  <a:schemeClr val="tx1"/>
+                </a:solidFill>
+              </a:ln>
+            </p:spPr>
+            <p:style>
+              <a:lnRef idx="1">
+                <a:schemeClr val="accent1"/>
+              </a:lnRef>
+              <a:fillRef idx="0">
+                <a:schemeClr val="accent1"/>
+              </a:fillRef>
+              <a:effectRef idx="0">
+                <a:schemeClr val="accent1"/>
+              </a:effectRef>
+              <a:fontRef idx="minor">
+                <a:schemeClr val="tx1"/>
+              </a:fontRef>
+            </p:style>
+            <p:txBody>
+              <a:bodyPr rtlCol="0" anchor="ctr"/>
+              <a:lstStyle/>
+              <a:p>
+                <a:pPr algn="ctr"/>
+                <a:endParaRPr lang="en-US" dirty="0"/>
+              </a:p>
+            </p:txBody>
+          </p:sp>
+          <p:cxnSp>
+            <p:nvCxnSpPr>
+              <p:cNvPr id="76" name="Straight Connector 75">
+                <a:extLst>
+                  <a:ext uri="{FF2B5EF4-FFF2-40B4-BE49-F238E27FC236}">
+                    <a16:creationId xmlns:a16="http://schemas.microsoft.com/office/drawing/2014/main" id="{E2B2CBC9-581F-FD03-690B-1964BBAF6C0B}"/>
+                  </a:ext>
+                </a:extLst>
+              </p:cNvPr>
+              <p:cNvCxnSpPr>
+                <a:cxnSpLocks/>
+                <a:stCxn id="75" idx="0"/>
+              </p:cNvCxnSpPr>
+              <p:nvPr/>
+            </p:nvCxnSpPr>
+            <p:spPr>
+              <a:xfrm>
+                <a:off x="4338637" y="3409950"/>
+                <a:ext cx="0" cy="1036005"/>
+              </a:xfrm>
+              <a:prstGeom prst="line">
+                <a:avLst/>
+              </a:prstGeom>
+              <a:ln w="12700">
+                <a:solidFill>
+                  <a:schemeClr val="tx1"/>
+                </a:solidFill>
+              </a:ln>
+            </p:spPr>
+            <p:style>
+              <a:lnRef idx="1">
+                <a:schemeClr val="accent1"/>
+              </a:lnRef>
+              <a:fillRef idx="0">
+                <a:schemeClr val="accent1"/>
+              </a:fillRef>
+              <a:effectRef idx="0">
+                <a:schemeClr val="accent1"/>
+              </a:effectRef>
+              <a:fontRef idx="minor">
+                <a:schemeClr val="tx1"/>
+              </a:fontRef>
+            </p:style>
+          </p:cxnSp>
+          <p:cxnSp>
+            <p:nvCxnSpPr>
+              <p:cNvPr id="77" name="Straight Connector 76">
+                <a:extLst>
+                  <a:ext uri="{FF2B5EF4-FFF2-40B4-BE49-F238E27FC236}">
+                    <a16:creationId xmlns:a16="http://schemas.microsoft.com/office/drawing/2014/main" id="{D6C53172-201B-F4F3-DD4F-EB899B09C086}"/>
+                  </a:ext>
+                </a:extLst>
+              </p:cNvPr>
+              <p:cNvCxnSpPr>
+                <a:cxnSpLocks/>
+              </p:cNvCxnSpPr>
+              <p:nvPr/>
+            </p:nvCxnSpPr>
+            <p:spPr>
+              <a:xfrm>
+                <a:off x="4759180" y="3409949"/>
+                <a:ext cx="0" cy="1036005"/>
+              </a:xfrm>
+              <a:prstGeom prst="line">
+                <a:avLst/>
+              </a:prstGeom>
+              <a:ln w="12700">
+                <a:solidFill>
+                  <a:schemeClr val="tx1"/>
+                </a:solidFill>
+              </a:ln>
+            </p:spPr>
+            <p:style>
+              <a:lnRef idx="1">
+                <a:schemeClr val="accent1"/>
+              </a:lnRef>
+              <a:fillRef idx="0">
+                <a:schemeClr val="accent1"/>
+              </a:fillRef>
+              <a:effectRef idx="0">
+                <a:schemeClr val="accent1"/>
+              </a:effectRef>
+              <a:fontRef idx="minor">
+                <a:schemeClr val="tx1"/>
+              </a:fontRef>
+            </p:style>
+          </p:cxnSp>
+        </p:grpSp>
+        <p:sp>
+          <p:nvSpPr>
+            <p:cNvPr id="61" name="Oval 14">
+              <a:extLst>
+                <a:ext uri="{FF2B5EF4-FFF2-40B4-BE49-F238E27FC236}">
+                  <a16:creationId xmlns:a16="http://schemas.microsoft.com/office/drawing/2014/main" id="{1F5C29EE-430C-1718-5D30-C2DEDC3C5E60}"/>
+                </a:ext>
+              </a:extLst>
+            </p:cNvPr>
+            <p:cNvSpPr/>
+            <p:nvPr/>
+          </p:nvSpPr>
+          <p:spPr>
+            <a:xfrm flipH="1">
+              <a:off x="4949681" y="6440594"/>
+              <a:ext cx="420544" cy="216536"/>
+            </a:xfrm>
+            <a:custGeom>
+              <a:avLst/>
+              <a:gdLst>
+                <a:gd name="connsiteX0" fmla="*/ 0 w 420543"/>
+                <a:gd name="connsiteY0" fmla="*/ 211928 h 423855"/>
+                <a:gd name="connsiteX1" fmla="*/ 210272 w 420543"/>
+                <a:gd name="connsiteY1" fmla="*/ 0 h 423855"/>
+                <a:gd name="connsiteX2" fmla="*/ 420544 w 420543"/>
+                <a:gd name="connsiteY2" fmla="*/ 211928 h 423855"/>
+                <a:gd name="connsiteX3" fmla="*/ 210272 w 420543"/>
+                <a:gd name="connsiteY3" fmla="*/ 423856 h 423855"/>
+                <a:gd name="connsiteX4" fmla="*/ 0 w 420543"/>
+                <a:gd name="connsiteY4" fmla="*/ 211928 h 423855"/>
+                <a:gd name="connsiteX0" fmla="*/ 0 w 420544"/>
+                <a:gd name="connsiteY0" fmla="*/ 211928 h 423856"/>
+                <a:gd name="connsiteX1" fmla="*/ 210272 w 420544"/>
+                <a:gd name="connsiteY1" fmla="*/ 0 h 423856"/>
+                <a:gd name="connsiteX2" fmla="*/ 420544 w 420544"/>
+                <a:gd name="connsiteY2" fmla="*/ 211928 h 423856"/>
+                <a:gd name="connsiteX3" fmla="*/ 210272 w 420544"/>
+                <a:gd name="connsiteY3" fmla="*/ 423856 h 423856"/>
+                <a:gd name="connsiteX4" fmla="*/ 0 w 420544"/>
+                <a:gd name="connsiteY4" fmla="*/ 211928 h 423856"/>
+                <a:gd name="connsiteX0" fmla="*/ 210272 w 420544"/>
+                <a:gd name="connsiteY0" fmla="*/ 0 h 423856"/>
+                <a:gd name="connsiteX1" fmla="*/ 420544 w 420544"/>
+                <a:gd name="connsiteY1" fmla="*/ 211928 h 423856"/>
+                <a:gd name="connsiteX2" fmla="*/ 210272 w 420544"/>
+                <a:gd name="connsiteY2" fmla="*/ 423856 h 423856"/>
+                <a:gd name="connsiteX3" fmla="*/ 0 w 420544"/>
+                <a:gd name="connsiteY3" fmla="*/ 211928 h 423856"/>
+                <a:gd name="connsiteX4" fmla="*/ 301712 w 420544"/>
+                <a:gd name="connsiteY4" fmla="*/ 91440 h 423856"/>
+                <a:gd name="connsiteX0" fmla="*/ 210272 w 420544"/>
+                <a:gd name="connsiteY0" fmla="*/ 0 h 423856"/>
+                <a:gd name="connsiteX1" fmla="*/ 420544 w 420544"/>
+                <a:gd name="connsiteY1" fmla="*/ 211928 h 423856"/>
+                <a:gd name="connsiteX2" fmla="*/ 210272 w 420544"/>
+                <a:gd name="connsiteY2" fmla="*/ 423856 h 423856"/>
+                <a:gd name="connsiteX3" fmla="*/ 0 w 420544"/>
+                <a:gd name="connsiteY3" fmla="*/ 211928 h 423856"/>
+                <a:gd name="connsiteX0" fmla="*/ 420544 w 420544"/>
+                <a:gd name="connsiteY0" fmla="*/ 0 h 211928"/>
+                <a:gd name="connsiteX1" fmla="*/ 210272 w 420544"/>
+                <a:gd name="connsiteY1" fmla="*/ 211928 h 211928"/>
+                <a:gd name="connsiteX2" fmla="*/ 0 w 420544"/>
+                <a:gd name="connsiteY2" fmla="*/ 0 h 211928"/>
+              </a:gdLst>
+              <a:ahLst/>
+              <a:cxnLst>
+                <a:cxn ang="0">
+                  <a:pos x="connsiteX0" y="connsiteY0"/>
+                </a:cxn>
+                <a:cxn ang="0">
+                  <a:pos x="connsiteX1" y="connsiteY1"/>
+                </a:cxn>
+                <a:cxn ang="0">
+                  <a:pos x="connsiteX2" y="connsiteY2"/>
+                </a:cxn>
+              </a:cxnLst>
+              <a:rect l="l" t="t" r="r" b="b"/>
+              <a:pathLst>
+                <a:path w="420544" h="211928">
+                  <a:moveTo>
+                    <a:pt x="420544" y="0"/>
+                  </a:moveTo>
+                  <a:cubicBezTo>
+                    <a:pt x="420544" y="117045"/>
+                    <a:pt x="326402" y="211928"/>
+                    <a:pt x="210272" y="211928"/>
+                  </a:cubicBezTo>
+                  <a:cubicBezTo>
+                    <a:pt x="94142" y="211928"/>
+                    <a:pt x="0" y="117045"/>
+                    <a:pt x="0" y="0"/>
+                  </a:cubicBezTo>
+                </a:path>
+              </a:pathLst>
+            </a:custGeom>
+            <a:solidFill>
+              <a:schemeClr val="bg1"/>
+            </a:solidFill>
+            <a:ln>
+              <a:solidFill>
+                <a:schemeClr val="tx1"/>
+              </a:solidFill>
+            </a:ln>
+          </p:spPr>
+          <p:style>
+            <a:lnRef idx="2">
+              <a:schemeClr val="accent1">
+                <a:shade val="50000"/>
+              </a:schemeClr>
+            </a:lnRef>
+            <a:fillRef idx="1">
+              <a:schemeClr val="accent1"/>
+            </a:fillRef>
+            <a:effectRef idx="0">
+              <a:schemeClr val="accent1"/>
+            </a:effectRef>
+            <a:fontRef idx="minor">
+              <a:schemeClr val="lt1"/>
+            </a:fontRef>
+          </p:style>
+          <p:txBody>
+            <a:bodyPr rtlCol="0" anchor="ctr"/>
+            <a:lstStyle/>
+            <a:p>
+              <a:pPr algn="ctr"/>
+              <a:endParaRPr lang="en-US"/>
+            </a:p>
+          </p:txBody>
+        </p:sp>
+        <p:cxnSp>
+          <p:nvCxnSpPr>
+            <p:cNvPr id="62" name="Straight Connector 61">
+              <a:extLst>
+                <a:ext uri="{FF2B5EF4-FFF2-40B4-BE49-F238E27FC236}">
+                  <a16:creationId xmlns:a16="http://schemas.microsoft.com/office/drawing/2014/main" id="{F429E6F6-B28A-1249-28ED-F15A8A85D32A}"/>
+                </a:ext>
+              </a:extLst>
+            </p:cNvPr>
+            <p:cNvCxnSpPr>
+              <a:cxnSpLocks/>
+              <a:stCxn id="69" idx="2"/>
+            </p:cNvCxnSpPr>
+            <p:nvPr/>
+          </p:nvCxnSpPr>
+          <p:spPr>
+            <a:xfrm flipH="1">
+              <a:off x="5370227" y="4907374"/>
+              <a:ext cx="1340" cy="1533221"/>
+            </a:xfrm>
+            <a:prstGeom prst="line">
+              <a:avLst/>
+            </a:prstGeom>
+            <a:ln w="12700">
+              <a:solidFill>
+                <a:schemeClr val="tx1"/>
+              </a:solidFill>
+            </a:ln>
+          </p:spPr>
+          <p:style>
+            <a:lnRef idx="1">
+              <a:schemeClr val="accent1"/>
+            </a:lnRef>
+            <a:fillRef idx="0">
+              <a:schemeClr val="accent1"/>
+            </a:fillRef>
+            <a:effectRef idx="0">
+              <a:schemeClr val="accent1"/>
+            </a:effectRef>
+            <a:fontRef idx="minor">
+              <a:schemeClr val="tx1"/>
+            </a:fontRef>
+          </p:style>
+        </p:cxnSp>
+        <p:cxnSp>
+          <p:nvCxnSpPr>
+            <p:cNvPr id="63" name="Straight Connector 62">
+              <a:extLst>
+                <a:ext uri="{FF2B5EF4-FFF2-40B4-BE49-F238E27FC236}">
+                  <a16:creationId xmlns:a16="http://schemas.microsoft.com/office/drawing/2014/main" id="{92AAFBDB-BBED-BD32-7F2A-0446A73B8F79}"/>
+                </a:ext>
+              </a:extLst>
+            </p:cNvPr>
+            <p:cNvCxnSpPr>
+              <a:cxnSpLocks/>
+              <a:stCxn id="74" idx="0"/>
+            </p:cNvCxnSpPr>
+            <p:nvPr/>
+          </p:nvCxnSpPr>
+          <p:spPr>
+            <a:xfrm>
+              <a:off x="4949683" y="4369491"/>
+              <a:ext cx="0" cy="2071103"/>
+            </a:xfrm>
+            <a:prstGeom prst="line">
+              <a:avLst/>
+            </a:prstGeom>
+            <a:ln w="12700">
+              <a:solidFill>
+                <a:schemeClr val="tx1"/>
+              </a:solidFill>
+            </a:ln>
+          </p:spPr>
+          <p:style>
+            <a:lnRef idx="1">
+              <a:schemeClr val="accent1"/>
+            </a:lnRef>
+            <a:fillRef idx="0">
+              <a:schemeClr val="accent1"/>
+            </a:fillRef>
+            <a:effectRef idx="0">
+              <a:schemeClr val="accent1"/>
+            </a:effectRef>
+            <a:fontRef idx="minor">
+              <a:schemeClr val="tx1"/>
+            </a:fontRef>
+          </p:style>
+        </p:cxnSp>
+        <p:sp>
+          <p:nvSpPr>
+            <p:cNvPr id="64" name="Arc 63">
+              <a:extLst>
+                <a:ext uri="{FF2B5EF4-FFF2-40B4-BE49-F238E27FC236}">
+                  <a16:creationId xmlns:a16="http://schemas.microsoft.com/office/drawing/2014/main" id="{7048325E-2403-86E0-1145-B28D800EA887}"/>
+                </a:ext>
+              </a:extLst>
+            </p:cNvPr>
+            <p:cNvSpPr/>
+            <p:nvPr/>
+          </p:nvSpPr>
+          <p:spPr>
+            <a:xfrm rot="16200000" flipH="1">
+              <a:off x="5502593" y="2208403"/>
+              <a:ext cx="796290" cy="539478"/>
+            </a:xfrm>
+            <a:prstGeom prst="arc">
+              <a:avLst/>
+            </a:prstGeom>
+            <a:ln w="12700">
+              <a:solidFill>
+                <a:schemeClr val="tx1"/>
+              </a:solidFill>
+            </a:ln>
+          </p:spPr>
+          <p:style>
+            <a:lnRef idx="1">
+              <a:schemeClr val="accent1"/>
+            </a:lnRef>
+            <a:fillRef idx="0">
+              <a:schemeClr val="accent1"/>
+            </a:fillRef>
+            <a:effectRef idx="0">
+              <a:schemeClr val="accent1"/>
+            </a:effectRef>
+            <a:fontRef idx="minor">
+              <a:schemeClr val="tx1"/>
+            </a:fontRef>
+          </p:style>
+          <p:txBody>
+            <a:bodyPr rtlCol="0" anchor="ctr"/>
+            <a:lstStyle/>
+            <a:p>
+              <a:pPr algn="ctr"/>
+              <a:endParaRPr lang="en-US"/>
+            </a:p>
+          </p:txBody>
+        </p:sp>
+        <p:grpSp>
+          <p:nvGrpSpPr>
+            <p:cNvPr id="65" name="Group 64">
+              <a:extLst>
+                <a:ext uri="{FF2B5EF4-FFF2-40B4-BE49-F238E27FC236}">
+                  <a16:creationId xmlns:a16="http://schemas.microsoft.com/office/drawing/2014/main" id="{A6966DC8-2091-21FA-D04D-766FCFCDE096}"/>
+                </a:ext>
+              </a:extLst>
+            </p:cNvPr>
+            <p:cNvGrpSpPr/>
+            <p:nvPr/>
+          </p:nvGrpSpPr>
+          <p:grpSpPr>
+            <a:xfrm flipH="1">
+              <a:off x="5443538" y="2876287"/>
+              <a:ext cx="914400" cy="1709740"/>
+              <a:chOff x="4338637" y="2952750"/>
+              <a:chExt cx="914400" cy="1709740"/>
+            </a:xfrm>
+          </p:grpSpPr>
+          <p:sp>
+            <p:nvSpPr>
+              <p:cNvPr id="70" name="Oval 14">
+                <a:extLst>
+                  <a:ext uri="{FF2B5EF4-FFF2-40B4-BE49-F238E27FC236}">
+                    <a16:creationId xmlns:a16="http://schemas.microsoft.com/office/drawing/2014/main" id="{3AC139BF-C790-4C21-E0EE-273A81D1C09D}"/>
+                  </a:ext>
+                </a:extLst>
+              </p:cNvPr>
+              <p:cNvSpPr/>
+              <p:nvPr/>
+            </p:nvSpPr>
+            <p:spPr>
+              <a:xfrm>
+                <a:off x="4338638" y="4445954"/>
+                <a:ext cx="420544" cy="216536"/>
+              </a:xfrm>
+              <a:custGeom>
+                <a:avLst/>
+                <a:gdLst>
+                  <a:gd name="connsiteX0" fmla="*/ 0 w 420543"/>
+                  <a:gd name="connsiteY0" fmla="*/ 211928 h 423855"/>
+                  <a:gd name="connsiteX1" fmla="*/ 210272 w 420543"/>
+                  <a:gd name="connsiteY1" fmla="*/ 0 h 423855"/>
+                  <a:gd name="connsiteX2" fmla="*/ 420544 w 420543"/>
+                  <a:gd name="connsiteY2" fmla="*/ 211928 h 423855"/>
+                  <a:gd name="connsiteX3" fmla="*/ 210272 w 420543"/>
+                  <a:gd name="connsiteY3" fmla="*/ 423856 h 423855"/>
+                  <a:gd name="connsiteX4" fmla="*/ 0 w 420543"/>
+                  <a:gd name="connsiteY4" fmla="*/ 211928 h 423855"/>
+                  <a:gd name="connsiteX0" fmla="*/ 0 w 420544"/>
+                  <a:gd name="connsiteY0" fmla="*/ 211928 h 423856"/>
+                  <a:gd name="connsiteX1" fmla="*/ 210272 w 420544"/>
+                  <a:gd name="connsiteY1" fmla="*/ 0 h 423856"/>
+                  <a:gd name="connsiteX2" fmla="*/ 420544 w 420544"/>
+                  <a:gd name="connsiteY2" fmla="*/ 211928 h 423856"/>
+                  <a:gd name="connsiteX3" fmla="*/ 210272 w 420544"/>
+                  <a:gd name="connsiteY3" fmla="*/ 423856 h 423856"/>
+                  <a:gd name="connsiteX4" fmla="*/ 0 w 420544"/>
+                  <a:gd name="connsiteY4" fmla="*/ 211928 h 423856"/>
+                  <a:gd name="connsiteX0" fmla="*/ 210272 w 420544"/>
+                  <a:gd name="connsiteY0" fmla="*/ 0 h 423856"/>
+                  <a:gd name="connsiteX1" fmla="*/ 420544 w 420544"/>
+                  <a:gd name="connsiteY1" fmla="*/ 211928 h 423856"/>
+                  <a:gd name="connsiteX2" fmla="*/ 210272 w 420544"/>
+                  <a:gd name="connsiteY2" fmla="*/ 423856 h 423856"/>
+                  <a:gd name="connsiteX3" fmla="*/ 0 w 420544"/>
+                  <a:gd name="connsiteY3" fmla="*/ 211928 h 423856"/>
+                  <a:gd name="connsiteX4" fmla="*/ 301712 w 420544"/>
+                  <a:gd name="connsiteY4" fmla="*/ 91440 h 423856"/>
+                  <a:gd name="connsiteX0" fmla="*/ 210272 w 420544"/>
+                  <a:gd name="connsiteY0" fmla="*/ 0 h 423856"/>
+                  <a:gd name="connsiteX1" fmla="*/ 420544 w 420544"/>
+                  <a:gd name="connsiteY1" fmla="*/ 211928 h 423856"/>
+                  <a:gd name="connsiteX2" fmla="*/ 210272 w 420544"/>
+                  <a:gd name="connsiteY2" fmla="*/ 423856 h 423856"/>
+                  <a:gd name="connsiteX3" fmla="*/ 0 w 420544"/>
+                  <a:gd name="connsiteY3" fmla="*/ 211928 h 423856"/>
+                  <a:gd name="connsiteX0" fmla="*/ 420544 w 420544"/>
+                  <a:gd name="connsiteY0" fmla="*/ 0 h 211928"/>
+                  <a:gd name="connsiteX1" fmla="*/ 210272 w 420544"/>
+                  <a:gd name="connsiteY1" fmla="*/ 211928 h 211928"/>
+                  <a:gd name="connsiteX2" fmla="*/ 0 w 420544"/>
+                  <a:gd name="connsiteY2" fmla="*/ 0 h 211928"/>
+                </a:gdLst>
+                <a:ahLst/>
+                <a:cxnLst>
+                  <a:cxn ang="0">
+                    <a:pos x="connsiteX0" y="connsiteY0"/>
+                  </a:cxn>
+                  <a:cxn ang="0">
+                    <a:pos x="connsiteX1" y="connsiteY1"/>
+                  </a:cxn>
+                  <a:cxn ang="0">
+                    <a:pos x="connsiteX2" y="connsiteY2"/>
+                  </a:cxn>
+                </a:cxnLst>
+                <a:rect l="l" t="t" r="r" b="b"/>
+                <a:pathLst>
+                  <a:path w="420544" h="211928">
+                    <a:moveTo>
+                      <a:pt x="420544" y="0"/>
+                    </a:moveTo>
+                    <a:cubicBezTo>
+                      <a:pt x="420544" y="117045"/>
+                      <a:pt x="326402" y="211928"/>
+                      <a:pt x="210272" y="211928"/>
+                    </a:cubicBezTo>
+                    <a:cubicBezTo>
+                      <a:pt x="94142" y="211928"/>
+                      <a:pt x="0" y="117045"/>
+                      <a:pt x="0" y="0"/>
+                    </a:cubicBezTo>
+                  </a:path>
+                </a:pathLst>
+              </a:custGeom>
+              <a:solidFill>
+                <a:schemeClr val="bg1"/>
+              </a:solidFill>
+              <a:ln>
+                <a:solidFill>
+                  <a:schemeClr val="tx1"/>
+                </a:solidFill>
+              </a:ln>
+            </p:spPr>
+            <p:style>
+              <a:lnRef idx="2">
+                <a:schemeClr val="accent1">
+                  <a:shade val="50000"/>
+                </a:schemeClr>
+              </a:lnRef>
+              <a:fillRef idx="1">
+                <a:schemeClr val="accent1"/>
+              </a:fillRef>
+              <a:effectRef idx="0">
+                <a:schemeClr val="accent1"/>
+              </a:effectRef>
+              <a:fontRef idx="minor">
+                <a:schemeClr val="lt1"/>
+              </a:fontRef>
+            </p:style>
+            <p:txBody>
+              <a:bodyPr rtlCol="0" anchor="ctr"/>
+              <a:lstStyle/>
+              <a:p>
+                <a:pPr algn="ctr"/>
+                <a:endParaRPr lang="en-US"/>
+              </a:p>
+            </p:txBody>
+          </p:sp>
+          <p:sp>
+            <p:nvSpPr>
+              <p:cNvPr id="71" name="Arc 70">
+                <a:extLst>
+                  <a:ext uri="{FF2B5EF4-FFF2-40B4-BE49-F238E27FC236}">
+                    <a16:creationId xmlns:a16="http://schemas.microsoft.com/office/drawing/2014/main" id="{DF57139A-1A33-73BA-0BC5-9410B3402F2B}"/>
+                  </a:ext>
+                </a:extLst>
+              </p:cNvPr>
+              <p:cNvSpPr/>
+              <p:nvPr/>
+            </p:nvSpPr>
+            <p:spPr>
+              <a:xfrm rot="16200000">
+                <a:off x="4338637" y="2952750"/>
+                <a:ext cx="914400" cy="914400"/>
+              </a:xfrm>
+              <a:prstGeom prst="arc">
+                <a:avLst/>
+              </a:prstGeom>
+              <a:ln w="12700">
+                <a:solidFill>
+                  <a:schemeClr val="tx1"/>
+                </a:solidFill>
+              </a:ln>
+            </p:spPr>
+            <p:style>
+              <a:lnRef idx="1">
+                <a:schemeClr val="accent1"/>
+              </a:lnRef>
+              <a:fillRef idx="0">
+                <a:schemeClr val="accent1"/>
+              </a:fillRef>
+              <a:effectRef idx="0">
+                <a:schemeClr val="accent1"/>
+              </a:effectRef>
+              <a:fontRef idx="minor">
+                <a:schemeClr val="tx1"/>
+              </a:fontRef>
+            </p:style>
+            <p:txBody>
+              <a:bodyPr rtlCol="0" anchor="ctr"/>
+              <a:lstStyle/>
+              <a:p>
+                <a:pPr algn="ctr"/>
+                <a:endParaRPr lang="en-US"/>
+              </a:p>
+            </p:txBody>
+          </p:sp>
+          <p:cxnSp>
+            <p:nvCxnSpPr>
+              <p:cNvPr id="72" name="Straight Connector 71">
+                <a:extLst>
+                  <a:ext uri="{FF2B5EF4-FFF2-40B4-BE49-F238E27FC236}">
+                    <a16:creationId xmlns:a16="http://schemas.microsoft.com/office/drawing/2014/main" id="{C6F066C4-7DEB-0D39-E8AE-246EBF21D6F1}"/>
+                  </a:ext>
+                </a:extLst>
+              </p:cNvPr>
+              <p:cNvCxnSpPr>
+                <a:cxnSpLocks/>
+                <a:stCxn id="71" idx="0"/>
+              </p:cNvCxnSpPr>
+              <p:nvPr/>
+            </p:nvCxnSpPr>
+            <p:spPr>
+              <a:xfrm>
+                <a:off x="4338637" y="3409950"/>
+                <a:ext cx="0" cy="1036005"/>
+              </a:xfrm>
+              <a:prstGeom prst="line">
+                <a:avLst/>
+              </a:prstGeom>
+              <a:ln w="12700">
+                <a:solidFill>
+                  <a:schemeClr val="tx1"/>
+                </a:solidFill>
+              </a:ln>
+            </p:spPr>
+            <p:style>
+              <a:lnRef idx="1">
+                <a:schemeClr val="accent1"/>
+              </a:lnRef>
+              <a:fillRef idx="0">
+                <a:schemeClr val="accent1"/>
+              </a:fillRef>
+              <a:effectRef idx="0">
+                <a:schemeClr val="accent1"/>
+              </a:effectRef>
+              <a:fontRef idx="minor">
+                <a:schemeClr val="tx1"/>
+              </a:fontRef>
+            </p:style>
+          </p:cxnSp>
+          <p:cxnSp>
+            <p:nvCxnSpPr>
+              <p:cNvPr id="73" name="Straight Connector 72">
+                <a:extLst>
+                  <a:ext uri="{FF2B5EF4-FFF2-40B4-BE49-F238E27FC236}">
+                    <a16:creationId xmlns:a16="http://schemas.microsoft.com/office/drawing/2014/main" id="{5FA347FF-5586-28F2-447A-9D28D098428A}"/>
+                  </a:ext>
+                </a:extLst>
+              </p:cNvPr>
+              <p:cNvCxnSpPr>
+                <a:cxnSpLocks/>
+              </p:cNvCxnSpPr>
+              <p:nvPr/>
+            </p:nvCxnSpPr>
+            <p:spPr>
+              <a:xfrm>
+                <a:off x="4759180" y="3409949"/>
+                <a:ext cx="0" cy="1036005"/>
+              </a:xfrm>
+              <a:prstGeom prst="line">
+                <a:avLst/>
+              </a:prstGeom>
+              <a:ln w="12700">
+                <a:solidFill>
+                  <a:schemeClr val="tx1"/>
+                </a:solidFill>
+              </a:ln>
+            </p:spPr>
+            <p:style>
+              <a:lnRef idx="1">
+                <a:schemeClr val="accent1"/>
+              </a:lnRef>
+              <a:fillRef idx="0">
+                <a:schemeClr val="accent1"/>
+              </a:fillRef>
+              <a:effectRef idx="0">
+                <a:schemeClr val="accent1"/>
+              </a:effectRef>
+              <a:fontRef idx="minor">
+                <a:schemeClr val="tx1"/>
+              </a:fontRef>
+            </p:style>
+          </p:cxnSp>
+        </p:grpSp>
+        <p:sp>
+          <p:nvSpPr>
+            <p:cNvPr id="66" name="Oval 14">
+              <a:extLst>
+                <a:ext uri="{FF2B5EF4-FFF2-40B4-BE49-F238E27FC236}">
+                  <a16:creationId xmlns:a16="http://schemas.microsoft.com/office/drawing/2014/main" id="{B2B727EF-BFAF-C043-3C87-E0180DA2663E}"/>
+                </a:ext>
+              </a:extLst>
+            </p:cNvPr>
+            <p:cNvSpPr/>
+            <p:nvPr/>
+          </p:nvSpPr>
+          <p:spPr>
+            <a:xfrm>
+              <a:off x="5516851" y="6440594"/>
+              <a:ext cx="420544" cy="216536"/>
+            </a:xfrm>
+            <a:custGeom>
+              <a:avLst/>
+              <a:gdLst>
+                <a:gd name="connsiteX0" fmla="*/ 0 w 420543"/>
+                <a:gd name="connsiteY0" fmla="*/ 211928 h 423855"/>
+                <a:gd name="connsiteX1" fmla="*/ 210272 w 420543"/>
+                <a:gd name="connsiteY1" fmla="*/ 0 h 423855"/>
+                <a:gd name="connsiteX2" fmla="*/ 420544 w 420543"/>
+                <a:gd name="connsiteY2" fmla="*/ 211928 h 423855"/>
+                <a:gd name="connsiteX3" fmla="*/ 210272 w 420543"/>
+                <a:gd name="connsiteY3" fmla="*/ 423856 h 423855"/>
+                <a:gd name="connsiteX4" fmla="*/ 0 w 420543"/>
+                <a:gd name="connsiteY4" fmla="*/ 211928 h 423855"/>
+                <a:gd name="connsiteX0" fmla="*/ 0 w 420544"/>
+                <a:gd name="connsiteY0" fmla="*/ 211928 h 423856"/>
+                <a:gd name="connsiteX1" fmla="*/ 210272 w 420544"/>
+                <a:gd name="connsiteY1" fmla="*/ 0 h 423856"/>
+                <a:gd name="connsiteX2" fmla="*/ 420544 w 420544"/>
+                <a:gd name="connsiteY2" fmla="*/ 211928 h 423856"/>
+                <a:gd name="connsiteX3" fmla="*/ 210272 w 420544"/>
+                <a:gd name="connsiteY3" fmla="*/ 423856 h 423856"/>
+                <a:gd name="connsiteX4" fmla="*/ 0 w 420544"/>
+                <a:gd name="connsiteY4" fmla="*/ 211928 h 423856"/>
+                <a:gd name="connsiteX0" fmla="*/ 210272 w 420544"/>
+                <a:gd name="connsiteY0" fmla="*/ 0 h 423856"/>
+                <a:gd name="connsiteX1" fmla="*/ 420544 w 420544"/>
+                <a:gd name="connsiteY1" fmla="*/ 211928 h 423856"/>
+                <a:gd name="connsiteX2" fmla="*/ 210272 w 420544"/>
+                <a:gd name="connsiteY2" fmla="*/ 423856 h 423856"/>
+                <a:gd name="connsiteX3" fmla="*/ 0 w 420544"/>
+                <a:gd name="connsiteY3" fmla="*/ 211928 h 423856"/>
+                <a:gd name="connsiteX4" fmla="*/ 301712 w 420544"/>
+                <a:gd name="connsiteY4" fmla="*/ 91440 h 423856"/>
+                <a:gd name="connsiteX0" fmla="*/ 210272 w 420544"/>
+                <a:gd name="connsiteY0" fmla="*/ 0 h 423856"/>
+                <a:gd name="connsiteX1" fmla="*/ 420544 w 420544"/>
+                <a:gd name="connsiteY1" fmla="*/ 211928 h 423856"/>
+                <a:gd name="connsiteX2" fmla="*/ 210272 w 420544"/>
+                <a:gd name="connsiteY2" fmla="*/ 423856 h 423856"/>
+                <a:gd name="connsiteX3" fmla="*/ 0 w 420544"/>
+                <a:gd name="connsiteY3" fmla="*/ 211928 h 423856"/>
+                <a:gd name="connsiteX0" fmla="*/ 420544 w 420544"/>
+                <a:gd name="connsiteY0" fmla="*/ 0 h 211928"/>
+                <a:gd name="connsiteX1" fmla="*/ 210272 w 420544"/>
+                <a:gd name="connsiteY1" fmla="*/ 211928 h 211928"/>
+                <a:gd name="connsiteX2" fmla="*/ 0 w 420544"/>
+                <a:gd name="connsiteY2" fmla="*/ 0 h 211928"/>
+              </a:gdLst>
+              <a:ahLst/>
+              <a:cxnLst>
+                <a:cxn ang="0">
+                  <a:pos x="connsiteX0" y="connsiteY0"/>
+                </a:cxn>
+                <a:cxn ang="0">
+                  <a:pos x="connsiteX1" y="connsiteY1"/>
+                </a:cxn>
+                <a:cxn ang="0">
+                  <a:pos x="connsiteX2" y="connsiteY2"/>
+                </a:cxn>
+              </a:cxnLst>
+              <a:rect l="l" t="t" r="r" b="b"/>
+              <a:pathLst>
+                <a:path w="420544" h="211928">
+                  <a:moveTo>
+                    <a:pt x="420544" y="0"/>
+                  </a:moveTo>
+                  <a:cubicBezTo>
+                    <a:pt x="420544" y="117045"/>
+                    <a:pt x="326402" y="211928"/>
+                    <a:pt x="210272" y="211928"/>
+                  </a:cubicBezTo>
+                  <a:cubicBezTo>
+                    <a:pt x="94142" y="211928"/>
+                    <a:pt x="0" y="117045"/>
+                    <a:pt x="0" y="0"/>
+                  </a:cubicBezTo>
+                </a:path>
+              </a:pathLst>
+            </a:custGeom>
+            <a:solidFill>
+              <a:schemeClr val="bg1"/>
+            </a:solidFill>
+            <a:ln>
+              <a:solidFill>
+                <a:schemeClr val="tx1"/>
+              </a:solidFill>
+            </a:ln>
+          </p:spPr>
+          <p:style>
+            <a:lnRef idx="2">
+              <a:schemeClr val="accent1">
+                <a:shade val="50000"/>
+              </a:schemeClr>
+            </a:lnRef>
+            <a:fillRef idx="1">
+              <a:schemeClr val="accent1"/>
+            </a:fillRef>
+            <a:effectRef idx="0">
+              <a:schemeClr val="accent1"/>
+            </a:effectRef>
+            <a:fontRef idx="minor">
+              <a:schemeClr val="lt1"/>
+            </a:fontRef>
+          </p:style>
+          <p:txBody>
+            <a:bodyPr rtlCol="0" anchor="ctr"/>
+            <a:lstStyle/>
+            <a:p>
+              <a:pPr algn="ctr"/>
+              <a:endParaRPr lang="en-US"/>
+            </a:p>
+          </p:txBody>
+        </p:sp>
+        <p:cxnSp>
+          <p:nvCxnSpPr>
+            <p:cNvPr id="67" name="Straight Connector 66">
+              <a:extLst>
+                <a:ext uri="{FF2B5EF4-FFF2-40B4-BE49-F238E27FC236}">
+                  <a16:creationId xmlns:a16="http://schemas.microsoft.com/office/drawing/2014/main" id="{7E7181E1-C171-9867-49C0-F1946B2A8B4F}"/>
+                </a:ext>
+              </a:extLst>
+            </p:cNvPr>
+            <p:cNvCxnSpPr>
+              <a:cxnSpLocks/>
+              <a:stCxn id="69" idx="0"/>
+            </p:cNvCxnSpPr>
+            <p:nvPr/>
+          </p:nvCxnSpPr>
+          <p:spPr>
+            <a:xfrm>
+              <a:off x="5516849" y="4907374"/>
+              <a:ext cx="1" cy="1533221"/>
+            </a:xfrm>
+            <a:prstGeom prst="line">
+              <a:avLst/>
+            </a:prstGeom>
+            <a:ln w="12700">
+              <a:solidFill>
+                <a:schemeClr val="tx1"/>
+              </a:solidFill>
+            </a:ln>
+          </p:spPr>
+          <p:style>
+            <a:lnRef idx="1">
+              <a:schemeClr val="accent1"/>
+            </a:lnRef>
+            <a:fillRef idx="0">
+              <a:schemeClr val="accent1"/>
+            </a:fillRef>
+            <a:effectRef idx="0">
+              <a:schemeClr val="accent1"/>
+            </a:effectRef>
+            <a:fontRef idx="minor">
+              <a:schemeClr val="tx1"/>
+            </a:fontRef>
+          </p:style>
+        </p:cxnSp>
+        <p:cxnSp>
+          <p:nvCxnSpPr>
+            <p:cNvPr id="68" name="Straight Connector 67">
+              <a:extLst>
+                <a:ext uri="{FF2B5EF4-FFF2-40B4-BE49-F238E27FC236}">
+                  <a16:creationId xmlns:a16="http://schemas.microsoft.com/office/drawing/2014/main" id="{04E8EF29-0360-F718-67C7-90521F6D7F44}"/>
+                </a:ext>
+              </a:extLst>
+            </p:cNvPr>
+            <p:cNvCxnSpPr>
+              <a:cxnSpLocks/>
+              <a:stCxn id="70" idx="0"/>
+            </p:cNvCxnSpPr>
+            <p:nvPr/>
+          </p:nvCxnSpPr>
+          <p:spPr>
+            <a:xfrm>
+              <a:off x="5937393" y="4369491"/>
+              <a:ext cx="0" cy="2071103"/>
+            </a:xfrm>
+            <a:prstGeom prst="line">
+              <a:avLst/>
+            </a:prstGeom>
+            <a:ln w="12700">
+              <a:solidFill>
+                <a:schemeClr val="tx1"/>
+              </a:solidFill>
+            </a:ln>
+          </p:spPr>
+          <p:style>
+            <a:lnRef idx="1">
+              <a:schemeClr val="accent1"/>
+            </a:lnRef>
+            <a:fillRef idx="0">
+              <a:schemeClr val="accent1"/>
+            </a:fillRef>
+            <a:effectRef idx="0">
+              <a:schemeClr val="accent1"/>
+            </a:effectRef>
+            <a:fontRef idx="minor">
+              <a:schemeClr val="tx1"/>
+            </a:fontRef>
+          </p:style>
+        </p:cxnSp>
+        <p:sp>
+          <p:nvSpPr>
+            <p:cNvPr id="69" name="Oval 67">
+              <a:extLst>
+                <a:ext uri="{FF2B5EF4-FFF2-40B4-BE49-F238E27FC236}">
+                  <a16:creationId xmlns:a16="http://schemas.microsoft.com/office/drawing/2014/main" id="{BCB0AB9D-2E4B-4037-7BF4-8560A844EC91}"/>
+                </a:ext>
+              </a:extLst>
+            </p:cNvPr>
+            <p:cNvSpPr/>
+            <p:nvPr/>
+          </p:nvSpPr>
+          <p:spPr>
+            <a:xfrm flipV="1">
+              <a:off x="5371567" y="4833315"/>
+              <a:ext cx="145282" cy="74059"/>
+            </a:xfrm>
+            <a:custGeom>
+              <a:avLst/>
+              <a:gdLst>
+                <a:gd name="connsiteX0" fmla="*/ 0 w 145282"/>
+                <a:gd name="connsiteY0" fmla="*/ 74059 h 148117"/>
+                <a:gd name="connsiteX1" fmla="*/ 72641 w 145282"/>
+                <a:gd name="connsiteY1" fmla="*/ 0 h 148117"/>
+                <a:gd name="connsiteX2" fmla="*/ 145282 w 145282"/>
+                <a:gd name="connsiteY2" fmla="*/ 74059 h 148117"/>
+                <a:gd name="connsiteX3" fmla="*/ 72641 w 145282"/>
+                <a:gd name="connsiteY3" fmla="*/ 148118 h 148117"/>
+                <a:gd name="connsiteX4" fmla="*/ 0 w 145282"/>
+                <a:gd name="connsiteY4" fmla="*/ 74059 h 148117"/>
+                <a:gd name="connsiteX0" fmla="*/ 72641 w 164081"/>
+                <a:gd name="connsiteY0" fmla="*/ 0 h 148118"/>
+                <a:gd name="connsiteX1" fmla="*/ 145282 w 164081"/>
+                <a:gd name="connsiteY1" fmla="*/ 74059 h 148118"/>
+                <a:gd name="connsiteX2" fmla="*/ 72641 w 164081"/>
+                <a:gd name="connsiteY2" fmla="*/ 148118 h 148118"/>
+                <a:gd name="connsiteX3" fmla="*/ 0 w 164081"/>
+                <a:gd name="connsiteY3" fmla="*/ 74059 h 148118"/>
+                <a:gd name="connsiteX4" fmla="*/ 164081 w 164081"/>
+                <a:gd name="connsiteY4" fmla="*/ 91440 h 148118"/>
+                <a:gd name="connsiteX0" fmla="*/ 72641 w 145282"/>
+                <a:gd name="connsiteY0" fmla="*/ 0 h 148118"/>
+                <a:gd name="connsiteX1" fmla="*/ 145282 w 145282"/>
+                <a:gd name="connsiteY1" fmla="*/ 74059 h 148118"/>
+                <a:gd name="connsiteX2" fmla="*/ 72641 w 145282"/>
+                <a:gd name="connsiteY2" fmla="*/ 148118 h 148118"/>
+                <a:gd name="connsiteX3" fmla="*/ 0 w 145282"/>
+                <a:gd name="connsiteY3" fmla="*/ 74059 h 148118"/>
+                <a:gd name="connsiteX0" fmla="*/ 145282 w 145282"/>
+                <a:gd name="connsiteY0" fmla="*/ 0 h 74059"/>
+                <a:gd name="connsiteX1" fmla="*/ 72641 w 145282"/>
+                <a:gd name="connsiteY1" fmla="*/ 74059 h 74059"/>
+                <a:gd name="connsiteX2" fmla="*/ 0 w 145282"/>
+                <a:gd name="connsiteY2" fmla="*/ 0 h 74059"/>
+              </a:gdLst>
+              <a:ahLst/>
+              <a:cxnLst>
+                <a:cxn ang="0">
+                  <a:pos x="connsiteX0" y="connsiteY0"/>
+                </a:cxn>
+                <a:cxn ang="0">
+                  <a:pos x="connsiteX1" y="connsiteY1"/>
+                </a:cxn>
+                <a:cxn ang="0">
+                  <a:pos x="connsiteX2" y="connsiteY2"/>
+                </a:cxn>
+              </a:cxnLst>
+              <a:rect l="l" t="t" r="r" b="b"/>
+              <a:pathLst>
+                <a:path w="145282" h="74059">
+                  <a:moveTo>
+                    <a:pt x="145282" y="0"/>
+                  </a:moveTo>
+                  <a:cubicBezTo>
+                    <a:pt x="145282" y="40902"/>
+                    <a:pt x="112760" y="74059"/>
+                    <a:pt x="72641" y="74059"/>
+                  </a:cubicBezTo>
+                  <a:cubicBezTo>
+                    <a:pt x="32522" y="74059"/>
+                    <a:pt x="0" y="40902"/>
+                    <a:pt x="0" y="0"/>
+                  </a:cubicBezTo>
+                </a:path>
+              </a:pathLst>
+            </a:custGeom>
+            <a:solidFill>
+              <a:schemeClr val="bg1"/>
+            </a:solidFill>
+            <a:ln>
+              <a:solidFill>
+                <a:schemeClr val="tx1"/>
+              </a:solidFill>
+            </a:ln>
+          </p:spPr>
+          <p:style>
+            <a:lnRef idx="2">
+              <a:schemeClr val="accent1">
+                <a:shade val="50000"/>
+              </a:schemeClr>
+            </a:lnRef>
+            <a:fillRef idx="1">
+              <a:schemeClr val="accent1"/>
+            </a:fillRef>
+            <a:effectRef idx="0">
+              <a:schemeClr val="accent1"/>
+            </a:effectRef>
+            <a:fontRef idx="minor">
+              <a:schemeClr val="lt1"/>
+            </a:fontRef>
+          </p:style>
+          <p:txBody>
+            <a:bodyPr rtlCol="0" anchor="ctr"/>
+            <a:lstStyle/>
+            <a:p>
+              <a:pPr algn="ctr"/>
+              <a:endParaRPr lang="en-US"/>
+            </a:p>
+          </p:txBody>
+        </p:sp>
+      </p:grpSp>
+    </p:spTree>
+    <p:extLst>
+      <p:ext uri="{BB962C8B-B14F-4D97-AF65-F5344CB8AC3E}">
+        <p14:creationId xmlns:p14="http://schemas.microsoft.com/office/powerpoint/2010/main" val="1752020342"/>
+      </p:ext>
+    </p:extLst>
+  </p:cSld>
+  <p:clrMapOvr>
+    <a:masterClrMapping/>
+  </p:clrMapOvr>
+</p:sld>
+</file>
+
 <file path=ppt/theme/theme1.xml><?xml version="1.0" encoding="utf-8"?>
 <a:theme xmlns:a="http://schemas.openxmlformats.org/drawingml/2006/main" name="Office Theme">
   <a:themeElements>

</xml_diff>